<commit_message>
add notes, fix typo
</commit_message>
<xml_diff>
--- a/slides/slides.pptx
+++ b/slides/slides.pptx
@@ -3990,7 +3990,7 @@
           <a:p>
             <a:fld id="{FAAAD869-7F52-48A0-9E19-C6828B8C1FC6}" type="datetimeFigureOut">
               <a:rPr lang="en-US" smtClean="0"/>
-              <a:t>2/8/2016</a:t>
+              <a:t>2/9/2016</a:t>
             </a:fld>
             <a:endParaRPr lang="en-US"/>
           </a:p>
@@ -4836,20 +4836,7 @@
               <a:rPr lang="fr-FR" baseline="0" dirty="0" smtClean="0"/>
               <a:t>.</a:t>
             </a:r>
-          </a:p>
-          <a:p>
-            <a:endParaRPr lang="en-US" dirty="0" smtClean="0"/>
-          </a:p>
-          <a:p>
-            <a:r>
-              <a:rPr lang="en-US" dirty="0" smtClean="0"/>
-              <a:t>- In this figure, we see how injecting bias works</a:t>
-            </a:r>
-            <a:r>
-              <a:rPr lang="en-US" baseline="0" dirty="0" smtClean="0"/>
-              <a:t> by subsampling the original dataset to achieve a bias of 0.1 while keeping the class label and the confounder distributions identical to the initial dataset.</a:t>
-            </a:r>
-            <a:endParaRPr lang="en-US" dirty="0"/>
+            <a:endParaRPr lang="fr-FR" baseline="0" dirty="0" smtClean="0"/>
           </a:p>
         </p:txBody>
       </p:sp>
@@ -5079,6 +5066,74 @@
               <a:rPr lang="fr-FR" baseline="0" dirty="0" err="1" smtClean="0"/>
               <a:t>accuracy</a:t>
             </a:r>
+            <a:endParaRPr lang="fr-FR" baseline="0" dirty="0" smtClean="0"/>
+          </a:p>
+          <a:p>
+            <a:pPr marL="171450" indent="-171450">
+              <a:buFontTx/>
+              <a:buChar char="-"/>
+            </a:pPr>
+            <a:endParaRPr lang="fr-FR" baseline="0" dirty="0" smtClean="0"/>
+          </a:p>
+          <a:p>
+            <a:pPr marL="171450" indent="-171450">
+              <a:buFontTx/>
+              <a:buChar char="-"/>
+            </a:pPr>
+            <a:r>
+              <a:rPr lang="fr-FR" baseline="0" dirty="0" err="1" smtClean="0"/>
+              <a:t>Others</a:t>
+            </a:r>
+            <a:r>
+              <a:rPr lang="fr-FR" baseline="0" dirty="0" smtClean="0"/>
+              <a:t> are </a:t>
+            </a:r>
+            <a:r>
+              <a:rPr lang="fr-FR" baseline="0" dirty="0" err="1" smtClean="0"/>
+              <a:t>ideas</a:t>
+            </a:r>
+            <a:r>
+              <a:rPr lang="fr-FR" baseline="0" dirty="0" smtClean="0"/>
+              <a:t> </a:t>
+            </a:r>
+            <a:r>
+              <a:rPr lang="fr-FR" baseline="0" dirty="0" err="1" smtClean="0"/>
+              <a:t>from</a:t>
+            </a:r>
+            <a:r>
+              <a:rPr lang="fr-FR" baseline="0" dirty="0" smtClean="0"/>
+              <a:t> social science </a:t>
+            </a:r>
+            <a:r>
+              <a:rPr lang="fr-FR" baseline="0" dirty="0" err="1" smtClean="0"/>
+              <a:t>implemented</a:t>
+            </a:r>
+            <a:r>
+              <a:rPr lang="fr-FR" baseline="0" dirty="0" smtClean="0"/>
+              <a:t> to compare to </a:t>
+            </a:r>
+            <a:r>
+              <a:rPr lang="fr-FR" baseline="0" dirty="0" err="1" smtClean="0"/>
+              <a:t>our</a:t>
+            </a:r>
+            <a:r>
+              <a:rPr lang="fr-FR" baseline="0" dirty="0" smtClean="0"/>
+              <a:t> </a:t>
+            </a:r>
+            <a:r>
+              <a:rPr lang="fr-FR" baseline="0" dirty="0" err="1" smtClean="0"/>
+              <a:t>method</a:t>
+            </a:r>
+            <a:r>
+              <a:rPr lang="fr-FR" baseline="0" smtClean="0"/>
+              <a:t>.</a:t>
+            </a:r>
+          </a:p>
+          <a:p>
+            <a:pPr marL="0" indent="0">
+              <a:buFontTx/>
+              <a:buNone/>
+            </a:pPr>
             <a:endParaRPr lang="fr-FR" baseline="0" dirty="0" smtClean="0"/>
           </a:p>
           <a:p>
@@ -8604,8 +8659,61 @@
             </a:r>
             <a:r>
               <a:rPr lang="fr-FR" baseline="0" dirty="0" smtClean="0"/>
-              <a:t>.</a:t>
-            </a:r>
+              <a:t>. This </a:t>
+            </a:r>
+            <a:r>
+              <a:rPr lang="fr-FR" baseline="0" dirty="0" err="1" smtClean="0"/>
+              <a:t>is</a:t>
+            </a:r>
+            <a:r>
+              <a:rPr lang="fr-FR" baseline="0" dirty="0" smtClean="0"/>
+              <a:t> </a:t>
+            </a:r>
+            <a:r>
+              <a:rPr lang="fr-FR" baseline="0" dirty="0" err="1" smtClean="0"/>
+              <a:t>especially</a:t>
+            </a:r>
+            <a:r>
+              <a:rPr lang="fr-FR" baseline="0" dirty="0" smtClean="0"/>
+              <a:t> </a:t>
+            </a:r>
+            <a:r>
+              <a:rPr lang="fr-FR" baseline="0" dirty="0" err="1" smtClean="0"/>
+              <a:t>witnessed</a:t>
+            </a:r>
+            <a:r>
+              <a:rPr lang="fr-FR" baseline="0" dirty="0" smtClean="0"/>
+              <a:t> in social media, </a:t>
+            </a:r>
+            <a:r>
+              <a:rPr lang="fr-FR" baseline="0" dirty="0" err="1" smtClean="0"/>
+              <a:t>where</a:t>
+            </a:r>
+            <a:r>
+              <a:rPr lang="fr-FR" baseline="0" dirty="0" smtClean="0"/>
+              <a:t> </a:t>
+            </a:r>
+            <a:r>
+              <a:rPr lang="fr-FR" baseline="0" dirty="0" err="1" smtClean="0"/>
+              <a:t>languages</a:t>
+            </a:r>
+            <a:r>
+              <a:rPr lang="fr-FR" baseline="0" dirty="0" smtClean="0"/>
+              <a:t> </a:t>
+            </a:r>
+            <a:r>
+              <a:rPr lang="fr-FR" baseline="0" dirty="0" err="1" smtClean="0"/>
+              <a:t>can</a:t>
+            </a:r>
+            <a:r>
+              <a:rPr lang="fr-FR" baseline="0" dirty="0" smtClean="0"/>
+              <a:t> change </a:t>
+            </a:r>
+            <a:r>
+              <a:rPr lang="fr-FR" baseline="0" dirty="0" err="1" smtClean="0"/>
+              <a:t>quickly</a:t>
+            </a:r>
+            <a:endParaRPr lang="fr-FR" baseline="0" dirty="0" smtClean="0"/>
           </a:p>
           <a:p>
             <a:pPr marL="0" lvl="0" indent="0">
@@ -19436,7 +19544,7 @@
           <a:p>
             <a:fld id="{285EE2EF-450C-4AB1-863E-1AB9ECC6F4A8}" type="datetime1">
               <a:rPr lang="en-US" smtClean="0"/>
-              <a:t>2/8/2016</a:t>
+              <a:t>2/9/2016</a:t>
             </a:fld>
             <a:endParaRPr lang="en-US" dirty="0"/>
           </a:p>
@@ -19647,7 +19755,7 @@
           <a:p>
             <a:fld id="{02113291-E271-4DC5-9AD3-4766BE44D5CD}" type="datetime1">
               <a:rPr lang="en-US" smtClean="0"/>
-              <a:t>2/8/2016</a:t>
+              <a:t>2/9/2016</a:t>
             </a:fld>
             <a:endParaRPr lang="en-US" dirty="0"/>
           </a:p>
@@ -19831,7 +19939,7 @@
           <a:p>
             <a:fld id="{88602952-954C-44DA-8B68-AE332788195E}" type="datetime1">
               <a:rPr lang="en-US" smtClean="0"/>
-              <a:t>2/8/2016</a:t>
+              <a:t>2/9/2016</a:t>
             </a:fld>
             <a:endParaRPr lang="en-US" dirty="0"/>
           </a:p>
@@ -20074,7 +20182,7 @@
           <a:p>
             <a:fld id="{4E4A068C-CA8D-49FF-8A92-1A0D66FC2041}" type="datetime1">
               <a:rPr lang="en-US" smtClean="0"/>
-              <a:t>2/8/2016</a:t>
+              <a:t>2/9/2016</a:t>
             </a:fld>
             <a:endParaRPr lang="en-US" dirty="0"/>
           </a:p>
@@ -26816,7 +26924,7 @@
           <a:p>
             <a:fld id="{CEC942C7-138D-44CF-83C6-275DFB2634AC}" type="datetime1">
               <a:rPr lang="en-US" smtClean="0"/>
-              <a:t>2/8/2016</a:t>
+              <a:t>2/9/2016</a:t>
             </a:fld>
             <a:endParaRPr lang="en-US" dirty="0"/>
           </a:p>
@@ -27094,7 +27202,7 @@
           <a:p>
             <a:fld id="{E55FA6F2-8D02-4340-B2E0-32D9BC184667}" type="datetime1">
               <a:rPr lang="en-US" smtClean="0"/>
-              <a:t>2/8/2016</a:t>
+              <a:t>2/9/2016</a:t>
             </a:fld>
             <a:endParaRPr lang="en-US" dirty="0"/>
           </a:p>
@@ -27501,7 +27609,7 @@
           <a:p>
             <a:fld id="{9D5FC7F4-C34E-4F0F-BF9B-5C1655CB6B58}" type="datetime1">
               <a:rPr lang="en-US" smtClean="0"/>
-              <a:t>2/8/2016</a:t>
+              <a:t>2/9/2016</a:t>
             </a:fld>
             <a:endParaRPr lang="en-US" dirty="0"/>
           </a:p>
@@ -27623,7 +27731,7 @@
           <a:p>
             <a:fld id="{309EF086-5F52-4F69-9798-D1D60485DDCD}" type="datetime1">
               <a:rPr lang="en-US" smtClean="0"/>
-              <a:t>2/8/2016</a:t>
+              <a:t>2/9/2016</a:t>
             </a:fld>
             <a:endParaRPr lang="en-US" dirty="0"/>
           </a:p>
@@ -27722,7 +27830,7 @@
           <a:p>
             <a:fld id="{EC1CC553-DF97-4908-83CB-2678F0B1D8DB}" type="datetime1">
               <a:rPr lang="en-US" smtClean="0"/>
-              <a:t>2/8/2016</a:t>
+              <a:t>2/9/2016</a:t>
             </a:fld>
             <a:endParaRPr lang="en-US" dirty="0"/>
           </a:p>
@@ -28018,7 +28126,7 @@
           <a:p>
             <a:fld id="{76E3A13B-F7AF-46AA-BB73-7120620AF5F2}" type="datetime1">
               <a:rPr lang="en-US" smtClean="0"/>
-              <a:t>2/8/2016</a:t>
+              <a:t>2/9/2016</a:t>
             </a:fld>
             <a:endParaRPr lang="en-US" dirty="0"/>
           </a:p>
@@ -28302,7 +28410,7 @@
           <a:p>
             <a:fld id="{D53B9274-90D4-4413-9837-EC0A021D5778}" type="datetime1">
               <a:rPr lang="en-US" smtClean="0"/>
-              <a:t>2/8/2016</a:t>
+              <a:t>2/9/2016</a:t>
             </a:fld>
             <a:endParaRPr lang="en-US" dirty="0"/>
           </a:p>
@@ -28556,7 +28664,7 @@
           <a:p>
             <a:fld id="{F8C17CF9-D75B-4452-87F8-7EC88804DB08}" type="datetime1">
               <a:rPr lang="en-US" smtClean="0"/>
-              <a:t>2/8/2016</a:t>
+              <a:t>2/9/2016</a:t>
             </a:fld>
             <a:endParaRPr lang="en-US" dirty="0"/>
           </a:p>
@@ -29360,112 +29468,6 @@
                 </a:pPr>
                 <a14:m>
                   <m:oMath xmlns:m="http://schemas.openxmlformats.org/officeDocument/2006/math">
-                    <m:r>
-                      <a:rPr lang="en-US" sz="2200" b="0" i="1" smtClean="0">
-                        <a:ln>
-                          <a:noFill/>
-                        </a:ln>
-                        <a:latin typeface="Cambria Math" panose="02040503050406030204" pitchFamily="18" charset="0"/>
-                      </a:rPr>
-                      <m:t>𝑃</m:t>
-                    </m:r>
-                    <m:d>
-                      <m:dPr>
-                        <m:ctrlPr>
-                          <a:rPr lang="fr-FR" sz="2200" i="1">
-                            <a:ln>
-                              <a:noFill/>
-                            </a:ln>
-                            <a:latin typeface="Cambria Math" panose="02040503050406030204" pitchFamily="18" charset="0"/>
-                          </a:rPr>
-                        </m:ctrlPr>
-                      </m:dPr>
-                      <m:e>
-                        <m:r>
-                          <a:rPr lang="fr-FR" sz="2200">
-                            <a:ln>
-                              <a:noFill/>
-                            </a:ln>
-                            <a:latin typeface="Cambria Math" panose="02040503050406030204" pitchFamily="18" charset="0"/>
-                          </a:rPr>
-                          <m:t>𝑦</m:t>
-                        </m:r>
-                        <m:r>
-                          <a:rPr lang="fr-FR" sz="2200">
-                            <a:ln>
-                              <a:noFill/>
-                            </a:ln>
-                            <a:latin typeface="Cambria Math" panose="02040503050406030204" pitchFamily="18" charset="0"/>
-                          </a:rPr>
-                          <m:t>=1</m:t>
-                        </m:r>
-                      </m:e>
-                      <m:e>
-                        <m:r>
-                          <a:rPr lang="fr-FR" sz="2200">
-                            <a:ln>
-                              <a:noFill/>
-                            </a:ln>
-                            <a:latin typeface="Cambria Math" panose="02040503050406030204" pitchFamily="18" charset="0"/>
-                          </a:rPr>
-                          <m:t>𝑧</m:t>
-                        </m:r>
-                        <m:r>
-                          <a:rPr lang="fr-FR" sz="2200">
-                            <a:ln>
-                              <a:noFill/>
-                            </a:ln>
-                            <a:latin typeface="Cambria Math" panose="02040503050406030204" pitchFamily="18" charset="0"/>
-                          </a:rPr>
-                          <m:t>=1</m:t>
-                        </m:r>
-                      </m:e>
-                    </m:d>
-                    <m:r>
-                      <a:rPr lang="en-US" sz="2200" b="0" i="1" smtClean="0">
-                        <a:ln>
-                          <a:noFill/>
-                        </a:ln>
-                        <a:latin typeface="Cambria Math" panose="02040503050406030204" pitchFamily="18" charset="0"/>
-                      </a:rPr>
-                      <m:t>=</m:t>
-                    </m:r>
-                    <m:r>
-                      <a:rPr lang="en-US" sz="2200" b="0" i="1" smtClean="0">
-                        <a:ln>
-                          <a:noFill/>
-                        </a:ln>
-                        <a:latin typeface="Cambria Math" panose="02040503050406030204" pitchFamily="18" charset="0"/>
-                      </a:rPr>
-                      <m:t>𝑏</m:t>
-                    </m:r>
-                  </m:oMath>
-                </a14:m>
-                <a:endParaRPr lang="en-US" sz="2200" dirty="0">
-                  <a:ln>
-                    <a:noFill/>
-                  </a:ln>
-                </a:endParaRPr>
-              </a:p>
-              <a:p>
-                <a:pPr marL="265176" lvl="1" indent="-137160" defTabSz="914400">
-                  <a:lnSpc>
-                    <a:spcPct val="150000"/>
-                  </a:lnSpc>
-                  <a:spcBef>
-                    <a:spcPts val="200"/>
-                  </a:spcBef>
-                  <a:spcAft>
-                    <a:spcPts val="400"/>
-                  </a:spcAft>
-                  <a:buClr>
-                    <a:schemeClr val="accent1"/>
-                  </a:buClr>
-                  <a:buFont typeface="Wingdings 3" pitchFamily="18" charset="2"/>
-                  <a:buChar char=""/>
-                </a:pPr>
-                <a14:m>
-                  <m:oMath xmlns:m="http://schemas.openxmlformats.org/officeDocument/2006/math">
                     <m:sSub>
                       <m:sSubPr>
                         <m:ctrlPr>
@@ -29614,138 +29616,43 @@
                   <a:buFont typeface="Wingdings 3" pitchFamily="18" charset="2"/>
                   <a:buChar char=""/>
                 </a:pPr>
-                <a14:m>
-                  <m:oMath xmlns:m="http://schemas.openxmlformats.org/officeDocument/2006/math">
-                    <m:sSub>
-                      <m:sSubPr>
-                        <m:ctrlPr>
-                          <a:rPr lang="fr-FR" sz="2200" i="1">
-                            <a:ln>
-                              <a:noFill/>
-                            </a:ln>
-                            <a:latin typeface="Cambria Math" panose="02040503050406030204" pitchFamily="18" charset="0"/>
-                          </a:rPr>
-                        </m:ctrlPr>
-                      </m:sSubPr>
-                      <m:e>
-                        <m:r>
-                          <a:rPr lang="fr-FR" sz="2200">
-                            <a:ln>
-                              <a:noFill/>
-                            </a:ln>
-                            <a:latin typeface="Cambria Math" panose="02040503050406030204" pitchFamily="18" charset="0"/>
-                          </a:rPr>
-                          <m:t>𝑃</m:t>
-                        </m:r>
-                      </m:e>
-                      <m:sub>
-                        <m:r>
-                          <a:rPr lang="fr-FR" sz="2200">
-                            <a:ln>
-                              <a:noFill/>
-                            </a:ln>
-                            <a:latin typeface="Cambria Math" panose="02040503050406030204" pitchFamily="18" charset="0"/>
-                          </a:rPr>
-                          <m:t>𝑡𝑟𝑎𝑖𝑛</m:t>
-                        </m:r>
-                      </m:sub>
-                    </m:sSub>
-                    <m:d>
-                      <m:dPr>
-                        <m:ctrlPr>
-                          <a:rPr lang="fr-FR" sz="2200" i="1">
-                            <a:ln>
-                              <a:noFill/>
-                            </a:ln>
-                            <a:latin typeface="Cambria Math" panose="02040503050406030204" pitchFamily="18" charset="0"/>
-                          </a:rPr>
-                        </m:ctrlPr>
-                      </m:dPr>
-                      <m:e>
-                        <m:r>
-                          <a:rPr lang="fr-FR" sz="2200">
-                            <a:ln>
-                              <a:noFill/>
-                            </a:ln>
-                            <a:latin typeface="Cambria Math" panose="02040503050406030204" pitchFamily="18" charset="0"/>
-                          </a:rPr>
-                          <m:t>𝑍</m:t>
-                        </m:r>
-                      </m:e>
-                    </m:d>
-                    <m:r>
-                      <a:rPr lang="fr-FR" sz="2200">
-                        <a:ln>
-                          <a:noFill/>
-                        </a:ln>
-                        <a:latin typeface="Cambria Math" panose="02040503050406030204" pitchFamily="18" charset="0"/>
-                      </a:rPr>
-                      <m:t>=</m:t>
-                    </m:r>
-                    <m:sSub>
-                      <m:sSubPr>
-                        <m:ctrlPr>
-                          <a:rPr lang="fr-FR" sz="2200" i="1">
-                            <a:ln>
-                              <a:noFill/>
-                            </a:ln>
-                            <a:latin typeface="Cambria Math" panose="02040503050406030204" pitchFamily="18" charset="0"/>
-                          </a:rPr>
-                        </m:ctrlPr>
-                      </m:sSubPr>
-                      <m:e>
-                        <m:r>
-                          <a:rPr lang="fr-FR" sz="2200">
-                            <a:ln>
-                              <a:noFill/>
-                            </a:ln>
-                            <a:latin typeface="Cambria Math" panose="02040503050406030204" pitchFamily="18" charset="0"/>
-                          </a:rPr>
-                          <m:t>𝑃</m:t>
-                        </m:r>
-                      </m:e>
-                      <m:sub>
-                        <m:r>
-                          <a:rPr lang="fr-FR" sz="2200">
-                            <a:ln>
-                              <a:noFill/>
-                            </a:ln>
-                            <a:latin typeface="Cambria Math" panose="02040503050406030204" pitchFamily="18" charset="0"/>
-                          </a:rPr>
-                          <m:t>𝑡𝑒𝑠𝑡</m:t>
-                        </m:r>
-                      </m:sub>
-                    </m:sSub>
-                    <m:r>
-                      <a:rPr lang="fr-FR" sz="2200">
-                        <a:ln>
-                          <a:noFill/>
-                        </a:ln>
-                        <a:latin typeface="Cambria Math" panose="02040503050406030204" pitchFamily="18" charset="0"/>
-                      </a:rPr>
-                      <m:t>(</m:t>
-                    </m:r>
-                    <m:r>
-                      <a:rPr lang="fr-FR" sz="2200">
-                        <a:ln>
-                          <a:noFill/>
-                        </a:ln>
-                        <a:latin typeface="Cambria Math" panose="02040503050406030204" pitchFamily="18" charset="0"/>
-                      </a:rPr>
-                      <m:t>𝑍</m:t>
-                    </m:r>
-                    <m:r>
-                      <a:rPr lang="fr-FR" sz="2200">
-                        <a:ln>
-                          <a:noFill/>
-                        </a:ln>
-                        <a:latin typeface="Cambria Math" panose="02040503050406030204" pitchFamily="18" charset="0"/>
-                      </a:rPr>
-                      <m:t>)</m:t>
-                    </m:r>
-                  </m:oMath>
-                </a14:m>
-                <a:endParaRPr lang="en-US" sz="2200" dirty="0">
+                <a14:m/>
+              </a:p>
+              <a:p>
+                <a:pPr marL="265176" lvl="1" indent="-137160" defTabSz="914400">
+                  <a:lnSpc>
+                    <a:spcPct val="150000"/>
+                  </a:lnSpc>
+                  <a:spcBef>
+                    <a:spcPts val="200"/>
+                  </a:spcBef>
+                  <a:spcAft>
+                    <a:spcPts val="400"/>
+                  </a:spcAft>
+                  <a:buClr>
+                    <a:schemeClr val="accent1"/>
+                  </a:buClr>
+                  <a:buFont typeface="Wingdings 3" pitchFamily="18" charset="2"/>
+                  <a:buChar char=""/>
+                </a:pPr>
+                <a:endParaRPr lang="en-US" sz="2200" dirty="0"/>
+              </a:p>
+              <a:p>
+                <a:pPr marL="128016" lvl="1" defTabSz="914400">
+                  <a:lnSpc>
+                    <a:spcPct val="150000"/>
+                  </a:lnSpc>
+                  <a:spcBef>
+                    <a:spcPts val="200"/>
+                  </a:spcBef>
+                  <a:spcAft>
+                    <a:spcPts val="400"/>
+                  </a:spcAft>
+                  <a:buClr>
+                    <a:schemeClr val="accent1"/>
+                  </a:buClr>
+                </a:pPr>
+                <a:endParaRPr lang="en-US" sz="2200" dirty="0" smtClean="0">
                   <a:ln>
                     <a:noFill/>
                   </a:ln>
@@ -29986,8 +29893,8 @@
           </a:graphicData>
         </a:graphic>
       </p:graphicFrame>
-      <mc:AlternateContent xmlns:mc="http://schemas.openxmlformats.org/markup-compatibility/2006">
-        <mc:Choice xmlns:a14="http://schemas.microsoft.com/office/drawing/2010/main" Requires="a14">
+      <mc:AlternateContent xmlns:mc="http://schemas.openxmlformats.org/markup-compatibility/2006" xmlns:a14="http://schemas.microsoft.com/office/drawing/2010/main">
+        <mc:Choice Requires="a14">
           <p:sp>
             <p:nvSpPr>
               <p:cNvPr id="13" name="TextBox 12"/>
@@ -30146,7 +30053,7 @@
             </p:txBody>
           </p:sp>
         </mc:Choice>
-        <mc:Fallback>
+        <mc:Fallback xmlns="">
           <p:sp>
             <p:nvSpPr>
               <p:cNvPr id="13" name="TextBox 12"/>
@@ -30409,8 +30316,8 @@
           </a:graphicData>
         </a:graphic>
       </p:graphicFrame>
-      <mc:AlternateContent xmlns:mc="http://schemas.openxmlformats.org/markup-compatibility/2006">
-        <mc:Choice xmlns:a14="http://schemas.microsoft.com/office/drawing/2010/main" Requires="a14">
+      <mc:AlternateContent xmlns:mc="http://schemas.openxmlformats.org/markup-compatibility/2006" xmlns:a14="http://schemas.microsoft.com/office/drawing/2010/main">
+        <mc:Choice Requires="a14">
           <p:sp>
             <p:nvSpPr>
               <p:cNvPr id="13" name="TextBox 12"/>
@@ -30569,7 +30476,7 @@
             </p:txBody>
           </p:sp>
         </mc:Choice>
-        <mc:Fallback>
+        <mc:Fallback xmlns="">
           <p:sp>
             <p:nvSpPr>
               <p:cNvPr id="13" name="TextBox 12"/>
@@ -31367,11 +31274,7 @@
             </a:pPr>
             <a:r>
               <a:rPr lang="en-US" dirty="0" smtClean="0"/>
-              <a:t>Coefficients of features predictive of </a:t>
-            </a:r>
-            <a:r>
-              <a:rPr lang="en-US" dirty="0" smtClean="0"/>
-              <a:t>the confounding variable:</a:t>
+              <a:t>Coefficients of features predictive of the confounding variable:</a:t>
             </a:r>
             <a:endParaRPr lang="en-US" dirty="0"/>
           </a:p>
@@ -31736,89 +31639,55 @@
           <a:p>
             <a:r>
               <a:rPr lang="en-US" dirty="0" smtClean="0"/>
-              <a:t>Development of text classification over more than 50 </a:t>
-            </a:r>
+              <a:t>Development of text classification over more than 50 years</a:t>
+            </a:r>
+          </a:p>
+          <a:p>
             <a:r>
               <a:rPr lang="en-US" dirty="0" smtClean="0"/>
-              <a:t>years</a:t>
+              <a:t>Mostly centered around categorization of documents into topics</a:t>
+            </a:r>
+          </a:p>
+          <a:p>
+            <a:r>
+              <a:rPr lang="en-US" dirty="0" smtClean="0"/>
+              <a:t>New areas of research (computational science):</a:t>
+            </a:r>
+          </a:p>
+          <a:p>
+            <a:pPr lvl="1"/>
+            <a:r>
+              <a:rPr lang="en-US" dirty="0" smtClean="0"/>
+              <a:t>Public health surveillance</a:t>
+            </a:r>
+          </a:p>
+          <a:p>
+            <a:pPr lvl="1"/>
+            <a:r>
+              <a:rPr lang="en-US" dirty="0" smtClean="0"/>
+              <a:t>Political science</a:t>
+            </a:r>
+          </a:p>
+          <a:p>
+            <a:pPr lvl="1"/>
+            <a:r>
+              <a:rPr lang="en-US" dirty="0" smtClean="0"/>
+              <a:t>Marketing</a:t>
+            </a:r>
+          </a:p>
+          <a:p>
+            <a:pPr lvl="1"/>
+            <a:r>
+              <a:rPr lang="en-US" dirty="0" err="1" smtClean="0"/>
+              <a:t>etc</a:t>
             </a:r>
             <a:endParaRPr lang="en-US" dirty="0" smtClean="0"/>
           </a:p>
           <a:p>
             <a:r>
               <a:rPr lang="en-US" dirty="0" smtClean="0"/>
-              <a:t>Mostly centered around categorization of documents into </a:t>
-            </a:r>
-            <a:r>
-              <a:rPr lang="en-US" dirty="0" smtClean="0"/>
-              <a:t>topics</a:t>
-            </a:r>
-            <a:endParaRPr lang="en-US" dirty="0" smtClean="0"/>
-          </a:p>
-          <a:p>
-            <a:r>
-              <a:rPr lang="en-US" dirty="0" smtClean="0"/>
-              <a:t>New areas of </a:t>
-            </a:r>
-            <a:r>
-              <a:rPr lang="en-US" dirty="0" smtClean="0"/>
-              <a:t>research (</a:t>
-            </a:r>
-            <a:r>
-              <a:rPr lang="en-US" smtClean="0"/>
-              <a:t>computational s:</a:t>
-            </a:r>
-            <a:endParaRPr lang="en-US" dirty="0" smtClean="0"/>
-          </a:p>
-          <a:p>
-            <a:pPr lvl="1"/>
-            <a:r>
-              <a:rPr lang="en-US" dirty="0" smtClean="0"/>
-              <a:t>Public health </a:t>
-            </a:r>
-            <a:r>
-              <a:rPr lang="en-US" dirty="0" smtClean="0"/>
-              <a:t>surveillance</a:t>
-            </a:r>
-            <a:endParaRPr lang="en-US" dirty="0" smtClean="0"/>
-          </a:p>
-          <a:p>
-            <a:pPr lvl="1"/>
-            <a:r>
-              <a:rPr lang="en-US" dirty="0" smtClean="0"/>
-              <a:t>Political </a:t>
-            </a:r>
-            <a:r>
-              <a:rPr lang="en-US" dirty="0" smtClean="0"/>
-              <a:t>science</a:t>
-            </a:r>
-            <a:endParaRPr lang="en-US" dirty="0" smtClean="0"/>
-          </a:p>
-          <a:p>
-            <a:pPr lvl="1"/>
-            <a:r>
-              <a:rPr lang="en-US" dirty="0" smtClean="0"/>
-              <a:t>Marketing</a:t>
-            </a:r>
-            <a:endParaRPr lang="en-US" dirty="0" smtClean="0"/>
-          </a:p>
-          <a:p>
-            <a:pPr lvl="1"/>
-            <a:r>
-              <a:rPr lang="en-US" dirty="0" smtClean="0"/>
-              <a:t>…</a:t>
-            </a:r>
-          </a:p>
-          <a:p>
-            <a:r>
-              <a:rPr lang="en-US" dirty="0" smtClean="0"/>
-              <a:t>But algorithms stay the same: standard supervised classification </a:t>
-            </a:r>
-            <a:r>
-              <a:rPr lang="en-US" dirty="0" smtClean="0"/>
-              <a:t>algorithms</a:t>
-            </a:r>
-            <a:endParaRPr lang="en-US" dirty="0" smtClean="0"/>
+              <a:t>But algorithms stay the same: standard supervised classification algorithms</a:t>
+            </a:r>
           </a:p>
           <a:p>
             <a:r>
@@ -31829,13 +31698,7 @@
               <a:rPr lang="en-US" dirty="0" smtClean="0">
                 <a:sym typeface="Wingdings" panose="05000000000000000000" pitchFamily="2" charset="2"/>
               </a:rPr>
-              <a:t> need classifiers robust to confounding </a:t>
-            </a:r>
-            <a:r>
-              <a:rPr lang="en-US" dirty="0" smtClean="0">
-                <a:sym typeface="Wingdings" panose="05000000000000000000" pitchFamily="2" charset="2"/>
-              </a:rPr>
-              <a:t>variables</a:t>
+              <a:t> need classifiers robust to confounding variables</a:t>
             </a:r>
             <a:endParaRPr lang="en-US" dirty="0"/>
           </a:p>
@@ -36392,7 +36255,7 @@
             </p:nvSpPr>
             <p:spPr>
               <a:xfrm>
-                <a:off x="4333009" y="4270658"/>
+                <a:off x="2512884" y="5155072"/>
                 <a:ext cx="3640248" cy="1132609"/>
               </a:xfrm>
               <a:prstGeom prst="rect">
@@ -36564,7 +36427,7 @@
             </p:nvSpPr>
             <p:spPr>
               <a:xfrm>
-                <a:off x="4333009" y="4270658"/>
+                <a:off x="2512884" y="5155072"/>
                 <a:ext cx="3640248" cy="1132609"/>
               </a:xfrm>
               <a:prstGeom prst="rect">
@@ -36603,7 +36466,7 @@
             <p:spPr>
               <a:xfrm>
                 <a:off x="4333008" y="2084832"/>
-                <a:ext cx="3794991" cy="1754609"/>
+                <a:ext cx="4810992" cy="2679400"/>
               </a:xfrm>
               <a:prstGeom prst="rect">
                 <a:avLst/>
@@ -36633,7 +36496,7 @@
                   <a:buChar char="§"/>
                 </a:pPr>
                 <a:r>
-                  <a:rPr lang="en-US" sz="2800" dirty="0"/>
+                  <a:rPr lang="en-US" sz="2600" dirty="0"/>
                   <a:t>Machine learning:</a:t>
                 </a:r>
               </a:p>
@@ -36654,6 +36517,21 @@
                   <a:buFont typeface="Wingdings 3" pitchFamily="18" charset="2"/>
                   <a:buChar char=""/>
                 </a:pPr>
+                <a:r>
+                  <a:rPr lang="en-US" sz="2400" dirty="0" smtClean="0"/>
+                  <a:t>Selection bias</a:t>
+                </a:r>
+                <a:r>
+                  <a:rPr lang="en-US" sz="2400" baseline="30000" dirty="0" smtClean="0"/>
+                  <a:t>1</a:t>
+                </a:r>
+                <a:r>
+                  <a:rPr lang="en-US" sz="2400" dirty="0" smtClean="0"/>
+                  <a:t>:</a:t>
+                </a:r>
+                <a:br>
+                  <a:rPr lang="en-US" sz="2400" dirty="0" smtClean="0"/>
+                </a:br>
                 <a14:m>
                   <m:oMath xmlns:m="http://schemas.openxmlformats.org/officeDocument/2006/math">
                     <m:sSub>
@@ -36768,6 +36646,13 @@
                   <a:buFont typeface="Wingdings 3" pitchFamily="18" charset="2"/>
                   <a:buChar char=""/>
                 </a:pPr>
+                <a:r>
+                  <a:rPr lang="en-US" sz="2400" dirty="0" smtClean="0"/>
+                  <a:t>Changing target distribution:</a:t>
+                </a:r>
+                <a:br>
+                  <a:rPr lang="en-US" sz="2400" dirty="0" smtClean="0"/>
+                </a:br>
                 <a14:m>
                   <m:oMath xmlns:m="http://schemas.openxmlformats.org/officeDocument/2006/math">
                     <m:sSub>
@@ -36880,7 +36765,7 @@
             <p:spPr>
               <a:xfrm>
                 <a:off x="4333008" y="2084832"/>
-                <a:ext cx="3794991" cy="1754609"/>
+                <a:ext cx="4810992" cy="2679400"/>
               </a:xfrm>
               <a:prstGeom prst="rect">
                 <a:avLst/>
@@ -36888,7 +36773,7 @@
               <a:blipFill>
                 <a:blip r:embed="rId4"/>
                 <a:stretch>
-                  <a:fillRect l="-2572"/>
+                  <a:fillRect l="-1774"/>
                 </a:stretch>
               </a:blipFill>
             </p:spPr>
@@ -36907,6 +36792,88 @@
           </p:sp>
         </mc:Fallback>
       </mc:AlternateContent>
+      <p:sp>
+        <p:nvSpPr>
+          <p:cNvPr id="9" name="TextBox 8"/>
+          <p:cNvSpPr txBox="1"/>
+          <p:nvPr/>
+        </p:nvSpPr>
+        <p:spPr>
+          <a:xfrm>
+            <a:off x="0" y="6377031"/>
+            <a:ext cx="4094019" cy="461665"/>
+          </a:xfrm>
+          <a:prstGeom prst="rect">
+            <a:avLst/>
+          </a:prstGeom>
+          <a:noFill/>
+        </p:spPr>
+        <p:txBody>
+          <a:bodyPr wrap="square" rtlCol="0">
+            <a:spAutoFit/>
+          </a:bodyPr>
+          <a:lstStyle/>
+          <a:p>
+            <a:r>
+              <a:rPr lang="en-US" sz="1200" dirty="0" smtClean="0">
+                <a:solidFill>
+                  <a:schemeClr val="bg1">
+                    <a:lumMod val="50000"/>
+                  </a:schemeClr>
+                </a:solidFill>
+              </a:rPr>
+              <a:t>1 - </a:t>
+            </a:r>
+            <a:r>
+              <a:rPr lang="en-US" sz="1200" dirty="0" err="1" smtClean="0">
+                <a:solidFill>
+                  <a:schemeClr val="bg1">
+                    <a:lumMod val="50000"/>
+                  </a:schemeClr>
+                </a:solidFill>
+              </a:rPr>
+              <a:t>Bareinboim</a:t>
+            </a:r>
+            <a:r>
+              <a:rPr lang="en-US" sz="1200" dirty="0">
+                <a:solidFill>
+                  <a:schemeClr val="bg1">
+                    <a:lumMod val="50000"/>
+                  </a:schemeClr>
+                </a:solidFill>
+              </a:rPr>
+              <a:t>, Elias and Judea Pearl. “Controlling Selection Bias in Causal Inference.” </a:t>
+            </a:r>
+            <a:r>
+              <a:rPr lang="en-US" sz="1200" i="1" dirty="0">
+                <a:solidFill>
+                  <a:schemeClr val="bg1">
+                    <a:lumMod val="50000"/>
+                  </a:schemeClr>
+                </a:solidFill>
+              </a:rPr>
+              <a:t>AAAI</a:t>
+            </a:r>
+            <a:r>
+              <a:rPr lang="en-US" sz="1200" dirty="0">
+                <a:solidFill>
+                  <a:schemeClr val="bg1">
+                    <a:lumMod val="50000"/>
+                  </a:schemeClr>
+                </a:solidFill>
+              </a:rPr>
+              <a:t>(2011).</a:t>
+            </a:r>
+            <a:endParaRPr lang="en-US" sz="1200" dirty="0">
+              <a:solidFill>
+                <a:schemeClr val="bg1">
+                  <a:lumMod val="50000"/>
+                </a:schemeClr>
+              </a:solidFill>
+            </a:endParaRPr>
+          </a:p>
+        </p:txBody>
+      </p:sp>
     </p:spTree>
     <p:extLst>
       <p:ext uri="{BB962C8B-B14F-4D97-AF65-F5344CB8AC3E}">
@@ -38201,8 +38168,8 @@
           </a:p>
         </p:txBody>
       </p:sp>
-      <mc:AlternateContent xmlns:mc="http://schemas.openxmlformats.org/markup-compatibility/2006">
-        <mc:Choice xmlns:a14="http://schemas.microsoft.com/office/drawing/2010/main" Requires="a14">
+      <mc:AlternateContent xmlns:mc="http://schemas.openxmlformats.org/markup-compatibility/2006" xmlns:a14="http://schemas.microsoft.com/office/drawing/2010/main">
+        <mc:Choice Requires="a14">
           <p:graphicFrame>
             <p:nvGraphicFramePr>
               <p:cNvPr id="6" name="Table 5"/>
@@ -39055,7 +39022,7 @@
             </a:graphic>
           </p:graphicFrame>
         </mc:Choice>
-        <mc:Fallback>
+        <mc:Fallback xmlns="">
           <p:graphicFrame>
             <p:nvGraphicFramePr>
               <p:cNvPr id="6" name="Table 5"/>
@@ -39561,8 +39528,8 @@
           </p:graphicFrame>
         </mc:Fallback>
       </mc:AlternateContent>
-      <mc:AlternateContent xmlns:mc="http://schemas.openxmlformats.org/markup-compatibility/2006">
-        <mc:Choice xmlns:a14="http://schemas.microsoft.com/office/drawing/2010/main" Requires="a14">
+      <mc:AlternateContent xmlns:mc="http://schemas.openxmlformats.org/markup-compatibility/2006" xmlns:a14="http://schemas.microsoft.com/office/drawing/2010/main">
+        <mc:Choice Requires="a14">
           <p:graphicFrame>
             <p:nvGraphicFramePr>
               <p:cNvPr id="8" name="Table 7"/>
@@ -39876,7 +39843,7 @@
             </a:graphic>
           </p:graphicFrame>
         </mc:Choice>
-        <mc:Fallback>
+        <mc:Fallback xmlns="">
           <p:graphicFrame>
             <p:nvGraphicFramePr>
               <p:cNvPr id="8" name="Table 7"/>

</xml_diff>

<commit_message>
update slides with more details on BAZ10
</commit_message>
<xml_diff>
--- a/slides/slides.pptx
+++ b/slides/slides.pptx
@@ -3990,7 +3990,7 @@
           <a:p>
             <a:fld id="{FAAAD869-7F52-48A0-9E19-C6828B8C1FC6}" type="datetimeFigureOut">
               <a:rPr lang="en-US" smtClean="0"/>
-              <a:t>2/9/2016</a:t>
+              <a:t>2/12/2016</a:t>
             </a:fld>
             <a:endParaRPr lang="en-US"/>
           </a:p>
@@ -4317,7 +4317,7 @@
           <a:p>
             <a:r>
               <a:rPr lang="en-US" baseline="0" dirty="0" smtClean="0"/>
-              <a:t>Nowadays, computational social science are using text classification in ways that it has been done before,</a:t>
+              <a:t>Nowadays, computational social science are using text classification in ways that didn’t exist before. Researchers are trying to classify persons and their online writings</a:t>
             </a:r>
             <a:endParaRPr lang="en-US" dirty="0"/>
           </a:p>
@@ -4624,48 +4624,20 @@
               <a:buChar char="-"/>
             </a:pPr>
             <a:r>
+              <a:rPr lang="fr-FR" baseline="0" dirty="0" smtClean="0"/>
+              <a:t> </a:t>
+            </a:r>
+            <a:r>
               <a:rPr lang="fr-FR" baseline="0" dirty="0" err="1" smtClean="0"/>
               <a:t>We</a:t>
             </a:r>
             <a:r>
               <a:rPr lang="fr-FR" baseline="0" dirty="0" smtClean="0"/>
-              <a:t> </a:t>
-            </a:r>
-            <a:r>
-              <a:rPr lang="fr-FR" baseline="0" dirty="0" err="1" smtClean="0"/>
-              <a:t>introduce</a:t>
-            </a:r>
-            <a:r>
-              <a:rPr lang="fr-FR" baseline="0" dirty="0" smtClean="0"/>
-              <a:t> a </a:t>
-            </a:r>
-            <a:r>
-              <a:rPr lang="fr-FR" baseline="0" dirty="0" err="1" smtClean="0"/>
-              <a:t>given</a:t>
-            </a:r>
-            <a:r>
-              <a:rPr lang="fr-FR" baseline="0" dirty="0" smtClean="0"/>
-              <a:t> </a:t>
-            </a:r>
-            <a:r>
-              <a:rPr lang="fr-FR" baseline="0" dirty="0" err="1" smtClean="0"/>
-              <a:t>confounding</a:t>
-            </a:r>
-            <a:r>
-              <a:rPr lang="fr-FR" baseline="0" dirty="0" smtClean="0"/>
-              <a:t> </a:t>
-            </a:r>
-            <a:r>
-              <a:rPr lang="fr-FR" baseline="0" dirty="0" err="1" smtClean="0"/>
-              <a:t>bias</a:t>
-            </a:r>
-            <a:r>
-              <a:rPr lang="fr-FR" baseline="0" dirty="0" smtClean="0"/>
-              <a:t> in the new training </a:t>
-            </a:r>
-            <a:r>
-              <a:rPr lang="fr-FR" baseline="0" dirty="0" err="1" smtClean="0"/>
-              <a:t>dataset</a:t>
+              <a:t> do not alter the distributions of the class label or the </a:t>
+            </a:r>
+            <a:r>
+              <a:rPr lang="fr-FR" baseline="0" dirty="0" err="1" smtClean="0"/>
+              <a:t>confounder</a:t>
             </a:r>
             <a:endParaRPr lang="fr-FR" baseline="0" dirty="0" smtClean="0"/>
           </a:p>
@@ -4710,41 +4682,6 @@
               <a:rPr lang="fr-FR" baseline="0" dirty="0" err="1" smtClean="0"/>
               <a:t>bias</a:t>
             </a:r>
-            <a:r>
-              <a:rPr lang="fr-FR" baseline="0" dirty="0" smtClean="0"/>
-              <a:t> in the new </a:t>
-            </a:r>
-            <a:r>
-              <a:rPr lang="fr-FR" baseline="0" dirty="0" err="1" smtClean="0"/>
-              <a:t>testing</a:t>
-            </a:r>
-            <a:r>
-              <a:rPr lang="fr-FR" baseline="0" dirty="0" smtClean="0"/>
-              <a:t> </a:t>
-            </a:r>
-            <a:r>
-              <a:rPr lang="fr-FR" baseline="0" dirty="0" err="1" smtClean="0"/>
-              <a:t>dataset</a:t>
-            </a:r>
-            <a:endParaRPr lang="fr-FR" baseline="0" dirty="0" smtClean="0"/>
-          </a:p>
-          <a:p>
-            <a:pPr marL="628650" lvl="1" indent="-171450">
-              <a:buFontTx/>
-              <a:buChar char="-"/>
-            </a:pPr>
-            <a:r>
-              <a:rPr lang="fr-FR" baseline="0" dirty="0" err="1" smtClean="0"/>
-              <a:t>We</a:t>
-            </a:r>
-            <a:r>
-              <a:rPr lang="fr-FR" baseline="0" dirty="0" smtClean="0"/>
-              <a:t> do not alter the distributions of the class label or the </a:t>
-            </a:r>
-            <a:r>
-              <a:rPr lang="fr-FR" baseline="0" dirty="0" err="1" smtClean="0"/>
-              <a:t>confounder</a:t>
-            </a:r>
             <a:endParaRPr lang="fr-FR" baseline="0" dirty="0" smtClean="0"/>
           </a:p>
           <a:p>
@@ -4836,7 +4773,6 @@
               <a:rPr lang="fr-FR" baseline="0" dirty="0" smtClean="0"/>
               <a:t>.</a:t>
             </a:r>
-            <a:endParaRPr lang="fr-FR" baseline="0" dirty="0" smtClean="0"/>
           </a:p>
         </p:txBody>
       </p:sp>
@@ -4905,542 +4841,600 @@
         </p:nvSpPr>
         <p:spPr/>
       </p:sp>
-      <p:sp>
-        <p:nvSpPr>
-          <p:cNvPr id="3" name="Notes Placeholder 2"/>
-          <p:cNvSpPr>
-            <a:spLocks noGrp="1"/>
-          </p:cNvSpPr>
-          <p:nvPr>
-            <p:ph type="body" idx="1"/>
-          </p:nvPr>
-        </p:nvSpPr>
-        <p:spPr/>
-        <p:txBody>
-          <a:bodyPr/>
-          <a:lstStyle/>
-          <a:p>
-            <a:pPr marL="171450" indent="-171450">
-              <a:buFontTx/>
-              <a:buChar char="-"/>
-            </a:pPr>
-            <a:r>
-              <a:rPr lang="fr-FR" dirty="0" smtClean="0"/>
-              <a:t>LR:</a:t>
-            </a:r>
-            <a:r>
-              <a:rPr lang="fr-FR" baseline="0" dirty="0" smtClean="0"/>
-              <a:t> standard L2 </a:t>
-            </a:r>
-            <a:r>
-              <a:rPr lang="fr-FR" baseline="0" dirty="0" err="1" smtClean="0"/>
-              <a:t>regularized</a:t>
-            </a:r>
-            <a:r>
-              <a:rPr lang="fr-FR" baseline="0" dirty="0" smtClean="0"/>
-              <a:t> LR classifier, </a:t>
-            </a:r>
-            <a:r>
-              <a:rPr lang="fr-FR" baseline="0" dirty="0" err="1" smtClean="0"/>
-              <a:t>does</a:t>
-            </a:r>
-            <a:r>
-              <a:rPr lang="fr-FR" baseline="0" dirty="0" smtClean="0"/>
-              <a:t> not </a:t>
-            </a:r>
-            <a:r>
-              <a:rPr lang="fr-FR" baseline="0" dirty="0" err="1" smtClean="0"/>
-              <a:t>adjust</a:t>
-            </a:r>
-            <a:r>
-              <a:rPr lang="fr-FR" baseline="0" dirty="0" smtClean="0"/>
-              <a:t> for </a:t>
-            </a:r>
-            <a:r>
-              <a:rPr lang="fr-FR" baseline="0" dirty="0" err="1" smtClean="0"/>
-              <a:t>confounding</a:t>
-            </a:r>
-            <a:r>
-              <a:rPr lang="fr-FR" baseline="0" dirty="0" smtClean="0"/>
-              <a:t> variables</a:t>
-            </a:r>
-          </a:p>
-          <a:p>
-            <a:pPr marL="171450" indent="-171450">
-              <a:buFontTx/>
-              <a:buChar char="-"/>
-            </a:pPr>
-            <a:r>
-              <a:rPr lang="fr-FR" baseline="0" dirty="0" smtClean="0"/>
-              <a:t>BA </a:t>
-            </a:r>
-            <a:r>
-              <a:rPr lang="fr-FR" baseline="0" dirty="0" err="1" smtClean="0"/>
-              <a:t>is</a:t>
-            </a:r>
-            <a:r>
-              <a:rPr lang="fr-FR" baseline="0" dirty="0" smtClean="0"/>
-              <a:t> the </a:t>
-            </a:r>
-            <a:r>
-              <a:rPr lang="fr-FR" baseline="0" dirty="0" err="1" smtClean="0"/>
-              <a:t>method</a:t>
-            </a:r>
-            <a:r>
-              <a:rPr lang="fr-FR" baseline="0" dirty="0" smtClean="0"/>
-              <a:t> </a:t>
-            </a:r>
-            <a:r>
-              <a:rPr lang="fr-FR" baseline="0" dirty="0" err="1" smtClean="0"/>
-              <a:t>we</a:t>
-            </a:r>
-            <a:r>
-              <a:rPr lang="fr-FR" baseline="0" dirty="0" smtClean="0"/>
-              <a:t> </a:t>
-            </a:r>
-            <a:r>
-              <a:rPr lang="fr-FR" baseline="0" dirty="0" err="1" smtClean="0"/>
-              <a:t>used</a:t>
-            </a:r>
-            <a:r>
-              <a:rPr lang="fr-FR" baseline="0" dirty="0" smtClean="0"/>
-              <a:t>. BAZ10 </a:t>
-            </a:r>
-            <a:r>
-              <a:rPr lang="fr-FR" baseline="0" dirty="0" err="1" smtClean="0"/>
-              <a:t>is</a:t>
-            </a:r>
-            <a:r>
-              <a:rPr lang="fr-FR" baseline="0" dirty="0" smtClean="0"/>
-              <a:t> an </a:t>
-            </a:r>
-            <a:r>
-              <a:rPr lang="fr-FR" baseline="0" dirty="0" err="1" smtClean="0"/>
-              <a:t>improved</a:t>
-            </a:r>
-            <a:r>
-              <a:rPr lang="fr-FR" baseline="0" dirty="0" smtClean="0"/>
-              <a:t> </a:t>
-            </a:r>
-            <a:r>
-              <a:rPr lang="fr-FR" baseline="0" dirty="0" err="1" smtClean="0"/>
-              <a:t>method</a:t>
-            </a:r>
-            <a:r>
-              <a:rPr lang="fr-FR" baseline="0" dirty="0" smtClean="0"/>
-              <a:t> </a:t>
-            </a:r>
-            <a:r>
-              <a:rPr lang="fr-FR" baseline="0" dirty="0" err="1" smtClean="0"/>
-              <a:t>where</a:t>
-            </a:r>
-            <a:r>
-              <a:rPr lang="fr-FR" baseline="0" dirty="0" smtClean="0"/>
-              <a:t> </a:t>
-            </a:r>
-            <a:r>
-              <a:rPr lang="fr-FR" baseline="0" dirty="0" err="1" smtClean="0"/>
-              <a:t>we</a:t>
-            </a:r>
-            <a:r>
-              <a:rPr lang="fr-FR" baseline="0" dirty="0" smtClean="0"/>
-              <a:t> set v0 = 0 and v1 = 10 in </a:t>
-            </a:r>
-            <a:r>
-              <a:rPr lang="fr-FR" baseline="0" dirty="0" err="1" smtClean="0"/>
-              <a:t>order</a:t>
-            </a:r>
-            <a:r>
-              <a:rPr lang="fr-FR" baseline="0" dirty="0" smtClean="0"/>
-              <a:t> to </a:t>
-            </a:r>
-            <a:r>
-              <a:rPr lang="fr-FR" baseline="0" dirty="0" err="1" smtClean="0"/>
-              <a:t>improve</a:t>
-            </a:r>
-            <a:r>
-              <a:rPr lang="fr-FR" baseline="0" dirty="0" smtClean="0"/>
-              <a:t> </a:t>
-            </a:r>
-            <a:r>
-              <a:rPr lang="fr-FR" baseline="0" dirty="0" err="1" smtClean="0"/>
-              <a:t>accuracy</a:t>
-            </a:r>
-            <a:endParaRPr lang="fr-FR" baseline="0" dirty="0" smtClean="0"/>
-          </a:p>
-          <a:p>
-            <a:pPr marL="171450" indent="-171450">
-              <a:buFontTx/>
-              <a:buChar char="-"/>
-            </a:pPr>
-            <a:endParaRPr lang="fr-FR" baseline="0" dirty="0" smtClean="0"/>
-          </a:p>
-          <a:p>
-            <a:pPr marL="171450" indent="-171450">
-              <a:buFontTx/>
-              <a:buChar char="-"/>
-            </a:pPr>
-            <a:r>
-              <a:rPr lang="fr-FR" baseline="0" dirty="0" err="1" smtClean="0"/>
-              <a:t>Others</a:t>
-            </a:r>
-            <a:r>
-              <a:rPr lang="fr-FR" baseline="0" dirty="0" smtClean="0"/>
-              <a:t> are </a:t>
-            </a:r>
-            <a:r>
-              <a:rPr lang="fr-FR" baseline="0" dirty="0" err="1" smtClean="0"/>
-              <a:t>ideas</a:t>
-            </a:r>
-            <a:r>
-              <a:rPr lang="fr-FR" baseline="0" dirty="0" smtClean="0"/>
-              <a:t> </a:t>
-            </a:r>
-            <a:r>
-              <a:rPr lang="fr-FR" baseline="0" dirty="0" err="1" smtClean="0"/>
-              <a:t>from</a:t>
-            </a:r>
-            <a:r>
-              <a:rPr lang="fr-FR" baseline="0" dirty="0" smtClean="0"/>
-              <a:t> social science </a:t>
-            </a:r>
-            <a:r>
-              <a:rPr lang="fr-FR" baseline="0" dirty="0" err="1" smtClean="0"/>
-              <a:t>implemented</a:t>
-            </a:r>
-            <a:r>
-              <a:rPr lang="fr-FR" baseline="0" dirty="0" smtClean="0"/>
-              <a:t> to compare to </a:t>
-            </a:r>
-            <a:r>
-              <a:rPr lang="fr-FR" baseline="0" dirty="0" err="1" smtClean="0"/>
-              <a:t>our</a:t>
-            </a:r>
-            <a:r>
-              <a:rPr lang="fr-FR" baseline="0" dirty="0" smtClean="0"/>
-              <a:t> </a:t>
-            </a:r>
-            <a:r>
-              <a:rPr lang="fr-FR" baseline="0" dirty="0" err="1" smtClean="0"/>
-              <a:t>method</a:t>
-            </a:r>
-            <a:r>
-              <a:rPr lang="fr-FR" baseline="0" smtClean="0"/>
-              <a:t>.</a:t>
-            </a:r>
-          </a:p>
-          <a:p>
-            <a:pPr marL="0" indent="0">
-              <a:buFontTx/>
-              <a:buNone/>
-            </a:pPr>
-            <a:endParaRPr lang="fr-FR" baseline="0" dirty="0" smtClean="0"/>
-          </a:p>
-          <a:p>
-            <a:pPr marL="171450" indent="-171450">
-              <a:buFontTx/>
-              <a:buChar char="-"/>
-            </a:pPr>
-            <a:r>
-              <a:rPr lang="fr-FR" baseline="0" dirty="0" err="1" smtClean="0"/>
-              <a:t>Subsampling</a:t>
-            </a:r>
-            <a:r>
-              <a:rPr lang="fr-FR" baseline="0" dirty="0" smtClean="0"/>
-              <a:t> </a:t>
-            </a:r>
-            <a:r>
-              <a:rPr lang="fr-FR" baseline="0" dirty="0" err="1" smtClean="0"/>
-              <a:t>remove</a:t>
-            </a:r>
-            <a:r>
-              <a:rPr lang="fr-FR" baseline="0" dirty="0" smtClean="0"/>
-              <a:t> </a:t>
-            </a:r>
-            <a:r>
-              <a:rPr lang="fr-FR" baseline="0" dirty="0" err="1" smtClean="0"/>
-              <a:t>bias</a:t>
-            </a:r>
-            <a:r>
-              <a:rPr lang="fr-FR" baseline="0" dirty="0" smtClean="0"/>
-              <a:t> by </a:t>
-            </a:r>
-            <a:r>
-              <a:rPr lang="fr-FR" baseline="0" dirty="0" err="1" smtClean="0"/>
-              <a:t>selecting</a:t>
-            </a:r>
-            <a:r>
-              <a:rPr lang="fr-FR" baseline="0" dirty="0" smtClean="0"/>
-              <a:t> a </a:t>
-            </a:r>
-            <a:r>
-              <a:rPr lang="fr-FR" baseline="0" dirty="0" err="1" smtClean="0"/>
-              <a:t>subsample</a:t>
-            </a:r>
-            <a:r>
-              <a:rPr lang="fr-FR" baseline="0" dirty="0" smtClean="0"/>
-              <a:t> of the training </a:t>
-            </a:r>
-            <a:r>
-              <a:rPr lang="fr-FR" baseline="0" dirty="0" err="1" smtClean="0"/>
-              <a:t>dataset</a:t>
-            </a:r>
-            <a:r>
-              <a:rPr lang="fr-FR" baseline="0" dirty="0" smtClean="0"/>
-              <a:t> </a:t>
-            </a:r>
-            <a:r>
-              <a:rPr lang="fr-FR" baseline="0" dirty="0" err="1" smtClean="0"/>
-              <a:t>where</a:t>
-            </a:r>
-            <a:r>
-              <a:rPr lang="fr-FR" baseline="0" dirty="0" smtClean="0"/>
-              <a:t> P(Y, Z) </a:t>
-            </a:r>
-            <a:r>
-              <a:rPr lang="fr-FR" baseline="0" dirty="0" err="1" smtClean="0"/>
-              <a:t>is</a:t>
-            </a:r>
-            <a:r>
-              <a:rPr lang="fr-FR" baseline="0" dirty="0" smtClean="0"/>
-              <a:t> </a:t>
-            </a:r>
-            <a:r>
-              <a:rPr lang="fr-FR" baseline="0" dirty="0" err="1" smtClean="0"/>
-              <a:t>uniformly</a:t>
-            </a:r>
-            <a:r>
-              <a:rPr lang="fr-FR" baseline="0" dirty="0" smtClean="0"/>
-              <a:t> </a:t>
-            </a:r>
-            <a:r>
-              <a:rPr lang="fr-FR" baseline="0" dirty="0" err="1" smtClean="0"/>
-              <a:t>distributed</a:t>
-            </a:r>
-            <a:r>
-              <a:rPr lang="fr-FR" baseline="0" dirty="0" smtClean="0"/>
-              <a:t>. This </a:t>
-            </a:r>
-            <a:r>
-              <a:rPr lang="fr-FR" baseline="0" dirty="0" err="1" smtClean="0"/>
-              <a:t>approach</a:t>
-            </a:r>
-            <a:r>
-              <a:rPr lang="fr-FR" baseline="0" dirty="0" smtClean="0"/>
-              <a:t> </a:t>
-            </a:r>
-            <a:r>
-              <a:rPr lang="fr-FR" baseline="0" dirty="0" err="1" smtClean="0"/>
-              <a:t>can</a:t>
-            </a:r>
-            <a:r>
-              <a:rPr lang="fr-FR" baseline="0" dirty="0" smtClean="0"/>
-              <a:t> </a:t>
-            </a:r>
-            <a:r>
-              <a:rPr lang="fr-FR" baseline="0" dirty="0" err="1" smtClean="0"/>
-              <a:t>discard</a:t>
-            </a:r>
-            <a:r>
-              <a:rPr lang="fr-FR" baseline="0" dirty="0" smtClean="0"/>
-              <a:t> </a:t>
-            </a:r>
-            <a:r>
-              <a:rPr lang="fr-FR" baseline="0" dirty="0" err="1" smtClean="0"/>
-              <a:t>many</a:t>
-            </a:r>
-            <a:r>
-              <a:rPr lang="fr-FR" baseline="0" dirty="0" smtClean="0"/>
-              <a:t> instances </a:t>
-            </a:r>
-            <a:r>
-              <a:rPr lang="fr-FR" baseline="0" dirty="0" err="1" smtClean="0"/>
-              <a:t>when</a:t>
-            </a:r>
-            <a:r>
-              <a:rPr lang="fr-FR" baseline="0" dirty="0" smtClean="0"/>
-              <a:t> one of the pair y/z has a </a:t>
-            </a:r>
-            <a:r>
-              <a:rPr lang="fr-FR" baseline="0" dirty="0" err="1" smtClean="0"/>
-              <a:t>very</a:t>
-            </a:r>
-            <a:r>
-              <a:rPr lang="fr-FR" baseline="0" dirty="0" smtClean="0"/>
-              <a:t> </a:t>
-            </a:r>
-            <a:r>
-              <a:rPr lang="fr-FR" baseline="0" dirty="0" err="1" smtClean="0"/>
-              <a:t>small</a:t>
-            </a:r>
-            <a:r>
-              <a:rPr lang="fr-FR" baseline="0" dirty="0" smtClean="0"/>
-              <a:t> </a:t>
-            </a:r>
-            <a:r>
-              <a:rPr lang="fr-FR" baseline="0" dirty="0" err="1" smtClean="0"/>
-              <a:t>number</a:t>
-            </a:r>
-            <a:r>
-              <a:rPr lang="fr-FR" baseline="0" dirty="0" smtClean="0"/>
-              <a:t> of instances</a:t>
-            </a:r>
-          </a:p>
-          <a:p>
-            <a:pPr marL="171450" indent="-171450">
-              <a:buFontTx/>
-              <a:buChar char="-"/>
-            </a:pPr>
-            <a:r>
-              <a:rPr lang="fr-FR" baseline="0" dirty="0" err="1" smtClean="0"/>
-              <a:t>Matching</a:t>
-            </a:r>
-            <a:r>
-              <a:rPr lang="fr-FR" baseline="0" dirty="0" smtClean="0"/>
-              <a:t> has been </a:t>
-            </a:r>
-            <a:r>
-              <a:rPr lang="fr-FR" baseline="0" dirty="0" err="1" smtClean="0"/>
-              <a:t>described</a:t>
-            </a:r>
-            <a:r>
-              <a:rPr lang="fr-FR" baseline="0" dirty="0" smtClean="0"/>
-              <a:t> </a:t>
-            </a:r>
-            <a:r>
-              <a:rPr lang="fr-FR" baseline="0" dirty="0" err="1" smtClean="0"/>
-              <a:t>previously</a:t>
-            </a:r>
-            <a:r>
-              <a:rPr lang="fr-FR" baseline="0" dirty="0" smtClean="0"/>
-              <a:t>: </a:t>
-            </a:r>
-            <a:r>
-              <a:rPr lang="fr-FR" baseline="0" dirty="0" err="1" smtClean="0"/>
-              <a:t>it</a:t>
-            </a:r>
-            <a:r>
-              <a:rPr lang="fr-FR" baseline="0" dirty="0" smtClean="0"/>
-              <a:t> </a:t>
-            </a:r>
-            <a:r>
-              <a:rPr lang="fr-FR" baseline="0" dirty="0" err="1" smtClean="0"/>
-              <a:t>consists</a:t>
-            </a:r>
-            <a:r>
-              <a:rPr lang="fr-FR" baseline="0" dirty="0" smtClean="0"/>
-              <a:t> in training a pair-</a:t>
-            </a:r>
-            <a:r>
-              <a:rPr lang="fr-FR" baseline="0" dirty="0" err="1" smtClean="0"/>
-              <a:t>wise</a:t>
-            </a:r>
-            <a:r>
-              <a:rPr lang="fr-FR" baseline="0" dirty="0" smtClean="0"/>
-              <a:t> classifier</a:t>
-            </a:r>
-          </a:p>
-          <a:p>
-            <a:pPr marL="171450" indent="-171450">
-              <a:buFontTx/>
-              <a:buChar char="-"/>
-            </a:pPr>
-            <a:r>
-              <a:rPr lang="fr-FR" baseline="0" dirty="0" err="1" smtClean="0"/>
-              <a:t>Sum</a:t>
-            </a:r>
-            <a:r>
-              <a:rPr lang="fr-FR" baseline="0" dirty="0" smtClean="0"/>
-              <a:t> out model the distribution P(Y,Z|X) at training time, and </a:t>
-            </a:r>
-            <a:r>
-              <a:rPr lang="fr-FR" baseline="0" dirty="0" err="1" smtClean="0"/>
-              <a:t>sum</a:t>
-            </a:r>
-            <a:r>
-              <a:rPr lang="fr-FR" baseline="0" dirty="0" smtClean="0"/>
-              <a:t> over z at </a:t>
-            </a:r>
-            <a:r>
-              <a:rPr lang="fr-FR" baseline="0" dirty="0" err="1" smtClean="0"/>
-              <a:t>testing</a:t>
-            </a:r>
-            <a:r>
-              <a:rPr lang="fr-FR" baseline="0" dirty="0" smtClean="0"/>
-              <a:t> time to </a:t>
-            </a:r>
-            <a:r>
-              <a:rPr lang="fr-FR" baseline="0" dirty="0" err="1" smtClean="0"/>
-              <a:t>compute</a:t>
-            </a:r>
-            <a:r>
-              <a:rPr lang="fr-FR" baseline="0" dirty="0" smtClean="0"/>
-              <a:t> P(Y|X)</a:t>
-            </a:r>
-          </a:p>
-          <a:p>
-            <a:pPr marL="171450" indent="-171450">
-              <a:buFontTx/>
-              <a:buChar char="-"/>
-            </a:pPr>
-            <a:endParaRPr lang="fr-FR" baseline="0" dirty="0" smtClean="0"/>
-          </a:p>
-          <a:p>
-            <a:pPr marL="171450" indent="-171450">
-              <a:buFontTx/>
-              <a:buChar char="-"/>
-            </a:pPr>
-            <a:r>
-              <a:rPr lang="fr-FR" baseline="0" dirty="0" err="1" smtClean="0"/>
-              <a:t>Today</a:t>
-            </a:r>
-            <a:r>
-              <a:rPr lang="fr-FR" baseline="0" dirty="0" smtClean="0"/>
-              <a:t>, LR </a:t>
-            </a:r>
-            <a:r>
-              <a:rPr lang="fr-FR" baseline="0" dirty="0" err="1" smtClean="0"/>
-              <a:t>is</a:t>
-            </a:r>
-            <a:r>
-              <a:rPr lang="fr-FR" baseline="0" dirty="0" smtClean="0"/>
-              <a:t> the </a:t>
-            </a:r>
-            <a:r>
-              <a:rPr lang="fr-FR" baseline="0" dirty="0" err="1" smtClean="0"/>
-              <a:t>most</a:t>
-            </a:r>
-            <a:r>
-              <a:rPr lang="fr-FR" baseline="0" dirty="0" smtClean="0"/>
-              <a:t> </a:t>
-            </a:r>
-            <a:r>
-              <a:rPr lang="fr-FR" baseline="0" dirty="0" err="1" smtClean="0"/>
-              <a:t>used</a:t>
-            </a:r>
-            <a:r>
-              <a:rPr lang="fr-FR" baseline="0" dirty="0" smtClean="0"/>
-              <a:t> technique in </a:t>
-            </a:r>
-            <a:r>
-              <a:rPr lang="fr-FR" baseline="0" dirty="0" err="1" smtClean="0"/>
-              <a:t>text</a:t>
-            </a:r>
-            <a:r>
-              <a:rPr lang="fr-FR" baseline="0" dirty="0" smtClean="0"/>
-              <a:t> </a:t>
-            </a:r>
-            <a:r>
-              <a:rPr lang="fr-FR" baseline="0" dirty="0" err="1" smtClean="0"/>
-              <a:t>classificaiton</a:t>
-            </a:r>
-            <a:endParaRPr lang="fr-FR" baseline="0" dirty="0" smtClean="0"/>
-          </a:p>
-          <a:p>
-            <a:endParaRPr lang="en-US" dirty="0"/>
-          </a:p>
-        </p:txBody>
-      </p:sp>
+      <mc:AlternateContent xmlns:mc="http://schemas.openxmlformats.org/markup-compatibility/2006">
+        <mc:Choice xmlns:a14="http://schemas.microsoft.com/office/drawing/2010/main" Requires="a14">
+          <p:sp>
+            <p:nvSpPr>
+              <p:cNvPr id="3" name="Notes Placeholder 2"/>
+              <p:cNvSpPr>
+                <a:spLocks noGrp="1"/>
+              </p:cNvSpPr>
+              <p:nvPr>
+                <p:ph type="body" idx="1"/>
+              </p:nvPr>
+            </p:nvSpPr>
+            <p:spPr/>
+            <p:txBody>
+              <a:bodyPr/>
+              <a:lstStyle/>
+              <a:p>
+                <a:pPr marL="171450" indent="-171450">
+                  <a:buFontTx/>
+                  <a:buChar char="-"/>
+                </a:pPr>
+                <a:r>
+                  <a:rPr lang="en-US" baseline="0" noProof="0" dirty="0" smtClean="0"/>
+                  <a:t>BA is the method we described before. BAZ10 is an improved method that leverages undertraining to improve accuracy. By setting the features encoding z to 10 instead of 1, we increase the importance of these features and therefore reduce the importance of other features and specifically features related to the confounder. It has the same effect as distinguishing between the coefficients for the term vector </a:t>
+                </a:r>
+                <a14:m>
+                  <m:oMath xmlns:m="http://schemas.openxmlformats.org/officeDocument/2006/math">
+                    <m:sSup>
+                      <m:sSupPr>
+                        <m:ctrlPr>
+                          <a:rPr lang="en-US" b="0" i="1" baseline="0" noProof="0" smtClean="0">
+                            <a:latin typeface="Cambria Math" panose="02040503050406030204" pitchFamily="18" charset="0"/>
+                          </a:rPr>
+                        </m:ctrlPr>
+                      </m:sSupPr>
+                      <m:e>
+                        <m:r>
+                          <a:rPr lang="en-US" b="0" i="1" baseline="0" noProof="0" smtClean="0">
+                            <a:latin typeface="Cambria Math" panose="02040503050406030204" pitchFamily="18" charset="0"/>
+                          </a:rPr>
+                          <m:t>𝜃</m:t>
+                        </m:r>
+                      </m:e>
+                      <m:sup>
+                        <m:r>
+                          <a:rPr lang="en-US" b="0" i="1" baseline="0" noProof="0" smtClean="0">
+                            <a:latin typeface="Cambria Math" panose="02040503050406030204" pitchFamily="18" charset="0"/>
+                          </a:rPr>
+                          <m:t>𝑥</m:t>
+                        </m:r>
+                      </m:sup>
+                    </m:sSup>
+                  </m:oMath>
+                </a14:m>
+                <a:r>
+                  <a:rPr lang="en-US" baseline="0" noProof="0" dirty="0" smtClean="0"/>
+                  <a:t> and the coefficients (blue) for the confounder </a:t>
+                </a:r>
+                <a14:m>
+                  <m:oMath xmlns:m="http://schemas.openxmlformats.org/officeDocument/2006/math">
+                    <m:sSup>
+                      <m:sSupPr>
+                        <m:ctrlPr>
+                          <a:rPr lang="en-US" b="0" i="1" baseline="0" noProof="0" smtClean="0">
+                            <a:latin typeface="Cambria Math" panose="02040503050406030204" pitchFamily="18" charset="0"/>
+                          </a:rPr>
+                        </m:ctrlPr>
+                      </m:sSupPr>
+                      <m:e>
+                        <m:r>
+                          <a:rPr lang="en-US" b="0" i="1" baseline="0" noProof="0" smtClean="0">
+                            <a:latin typeface="Cambria Math" panose="02040503050406030204" pitchFamily="18" charset="0"/>
+                          </a:rPr>
+                          <m:t>𝜃</m:t>
+                        </m:r>
+                      </m:e>
+                      <m:sup>
+                        <m:r>
+                          <a:rPr lang="en-US" b="0" i="1" baseline="0" noProof="0" smtClean="0">
+                            <a:latin typeface="Cambria Math" panose="02040503050406030204" pitchFamily="18" charset="0"/>
+                          </a:rPr>
+                          <m:t>𝑧</m:t>
+                        </m:r>
+                      </m:sup>
+                    </m:sSup>
+                  </m:oMath>
+                </a14:m>
+                <a:r>
+                  <a:rPr lang="en-US" baseline="0" noProof="0" dirty="0" smtClean="0"/>
+                  <a:t> (red) in the L2-regularized log-likelihood function where </a:t>
+                </a:r>
+                <a14:m>
+                  <m:oMath xmlns:m="http://schemas.openxmlformats.org/officeDocument/2006/math">
+                    <m:sSub>
+                      <m:sSubPr>
+                        <m:ctrlPr>
+                          <a:rPr lang="en-US" b="0" i="1" baseline="0" noProof="0" smtClean="0">
+                            <a:latin typeface="Cambria Math" panose="02040503050406030204" pitchFamily="18" charset="0"/>
+                          </a:rPr>
+                        </m:ctrlPr>
+                      </m:sSubPr>
+                      <m:e>
+                        <m:r>
+                          <a:rPr lang="en-US" b="0" i="1" baseline="0" noProof="0" smtClean="0">
+                            <a:latin typeface="Cambria Math" panose="02040503050406030204" pitchFamily="18" charset="0"/>
+                          </a:rPr>
+                          <m:t>𝜆</m:t>
+                        </m:r>
+                      </m:e>
+                      <m:sub>
+                        <m:r>
+                          <a:rPr lang="en-US" b="0" i="1" baseline="0" noProof="0" smtClean="0">
+                            <a:latin typeface="Cambria Math" panose="02040503050406030204" pitchFamily="18" charset="0"/>
+                          </a:rPr>
+                          <m:t>𝑥</m:t>
+                        </m:r>
+                      </m:sub>
+                    </m:sSub>
+                  </m:oMath>
+                </a14:m>
+                <a:r>
+                  <a:rPr lang="en-US" baseline="0" noProof="0" dirty="0" smtClean="0"/>
+                  <a:t> and </a:t>
+                </a:r>
+                <a14:m>
+                  <m:oMath xmlns:m="http://schemas.openxmlformats.org/officeDocument/2006/math">
+                    <m:sSub>
+                      <m:sSubPr>
+                        <m:ctrlPr>
+                          <a:rPr lang="en-US" b="0" i="1" baseline="0" noProof="0" smtClean="0">
+                            <a:latin typeface="Cambria Math" panose="02040503050406030204" pitchFamily="18" charset="0"/>
+                          </a:rPr>
+                        </m:ctrlPr>
+                      </m:sSubPr>
+                      <m:e>
+                        <m:r>
+                          <a:rPr lang="en-US" b="0" i="1" baseline="0" noProof="0" smtClean="0">
+                            <a:latin typeface="Cambria Math" panose="02040503050406030204" pitchFamily="18" charset="0"/>
+                          </a:rPr>
+                          <m:t>𝜆</m:t>
+                        </m:r>
+                      </m:e>
+                      <m:sub>
+                        <m:r>
+                          <a:rPr lang="en-US" b="0" i="1" baseline="0" noProof="0" smtClean="0">
+                            <a:latin typeface="Cambria Math" panose="02040503050406030204" pitchFamily="18" charset="0"/>
+                          </a:rPr>
+                          <m:t>𝑧</m:t>
+                        </m:r>
+                      </m:sub>
+                    </m:sSub>
+                  </m:oMath>
+                </a14:m>
+                <a:r>
+                  <a:rPr lang="en-US" baseline="0" noProof="0" dirty="0" smtClean="0"/>
+                  <a:t> control the regularization strength of the term coefficients and confounder coefficients. By setting </a:t>
+                </a:r>
+                <a14:m>
+                  <m:oMath xmlns:m="http://schemas.openxmlformats.org/officeDocument/2006/math">
+                    <m:sSub>
+                      <m:sSubPr>
+                        <m:ctrlPr>
+                          <a:rPr lang="en-US" b="0" i="1" baseline="0" noProof="0" smtClean="0">
+                            <a:latin typeface="Cambria Math" panose="02040503050406030204" pitchFamily="18" charset="0"/>
+                          </a:rPr>
+                        </m:ctrlPr>
+                      </m:sSubPr>
+                      <m:e>
+                        <m:r>
+                          <a:rPr lang="en-US" b="0" i="1" baseline="0" noProof="0" smtClean="0">
+                            <a:latin typeface="Cambria Math" panose="02040503050406030204" pitchFamily="18" charset="0"/>
+                          </a:rPr>
+                          <m:t>𝜆</m:t>
+                        </m:r>
+                      </m:e>
+                      <m:sub>
+                        <m:r>
+                          <a:rPr lang="en-US" b="0" i="1" baseline="0" noProof="0" smtClean="0">
+                            <a:latin typeface="Cambria Math" panose="02040503050406030204" pitchFamily="18" charset="0"/>
+                          </a:rPr>
+                          <m:t>𝑧</m:t>
+                        </m:r>
+                      </m:sub>
+                    </m:sSub>
+                    <m:r>
+                      <a:rPr lang="en-US" b="0" i="1" baseline="0" noProof="0" smtClean="0">
+                        <a:latin typeface="Cambria Math" panose="02040503050406030204" pitchFamily="18" charset="0"/>
+                      </a:rPr>
+                      <m:t>&lt;</m:t>
+                    </m:r>
+                    <m:sSub>
+                      <m:sSubPr>
+                        <m:ctrlPr>
+                          <a:rPr lang="en-US" b="0" i="1" baseline="0" noProof="0" smtClean="0">
+                            <a:latin typeface="Cambria Math" panose="02040503050406030204" pitchFamily="18" charset="0"/>
+                          </a:rPr>
+                        </m:ctrlPr>
+                      </m:sSubPr>
+                      <m:e>
+                        <m:r>
+                          <a:rPr lang="en-US" b="0" i="1" baseline="0" noProof="0" smtClean="0">
+                            <a:latin typeface="Cambria Math" panose="02040503050406030204" pitchFamily="18" charset="0"/>
+                          </a:rPr>
+                          <m:t>𝜆</m:t>
+                        </m:r>
+                      </m:e>
+                      <m:sub>
+                        <m:r>
+                          <a:rPr lang="en-US" b="0" i="1" baseline="0" noProof="0" smtClean="0">
+                            <a:latin typeface="Cambria Math" panose="02040503050406030204" pitchFamily="18" charset="0"/>
+                          </a:rPr>
+                          <m:t>𝑥</m:t>
+                        </m:r>
+                      </m:sub>
+                    </m:sSub>
+                  </m:oMath>
+                </a14:m>
+                <a:r>
+                  <a:rPr lang="en-US" baseline="0" noProof="0" dirty="0" smtClean="0"/>
+                  <a:t>, we allow the coefficients </a:t>
+                </a:r>
+                <a14:m>
+                  <m:oMath xmlns:m="http://schemas.openxmlformats.org/officeDocument/2006/math">
+                    <m:sSup>
+                      <m:sSupPr>
+                        <m:ctrlPr>
+                          <a:rPr lang="en-US" b="0" i="1" baseline="0" noProof="0" smtClean="0">
+                            <a:latin typeface="Cambria Math" panose="02040503050406030204" pitchFamily="18" charset="0"/>
+                          </a:rPr>
+                        </m:ctrlPr>
+                      </m:sSupPr>
+                      <m:e>
+                        <m:r>
+                          <a:rPr lang="en-US" b="0" i="1" baseline="0" noProof="0" smtClean="0">
+                            <a:latin typeface="Cambria Math" panose="02040503050406030204" pitchFamily="18" charset="0"/>
+                          </a:rPr>
+                          <m:t>𝜃</m:t>
+                        </m:r>
+                      </m:e>
+                      <m:sup>
+                        <m:r>
+                          <a:rPr lang="en-US" b="0" i="1" baseline="0" noProof="0" smtClean="0">
+                            <a:latin typeface="Cambria Math" panose="02040503050406030204" pitchFamily="18" charset="0"/>
+                          </a:rPr>
+                          <m:t>𝑧</m:t>
+                        </m:r>
+                      </m:sup>
+                    </m:sSup>
+                  </m:oMath>
+                </a14:m>
+                <a:r>
+                  <a:rPr lang="en-US" baseline="0" noProof="0" dirty="0" smtClean="0"/>
+                  <a:t> to play a larger role in classification than </a:t>
+                </a:r>
+                <a14:m>
+                  <m:oMath xmlns:m="http://schemas.openxmlformats.org/officeDocument/2006/math">
+                    <m:sSup>
+                      <m:sSupPr>
+                        <m:ctrlPr>
+                          <a:rPr lang="en-US" b="0" i="1" baseline="0" noProof="0" smtClean="0">
+                            <a:latin typeface="Cambria Math" panose="02040503050406030204" pitchFamily="18" charset="0"/>
+                          </a:rPr>
+                        </m:ctrlPr>
+                      </m:sSupPr>
+                      <m:e>
+                        <m:r>
+                          <a:rPr lang="en-US" b="0" i="1" baseline="0" noProof="0" smtClean="0">
+                            <a:latin typeface="Cambria Math" panose="02040503050406030204" pitchFamily="18" charset="0"/>
+                          </a:rPr>
+                          <m:t>𝜃</m:t>
+                        </m:r>
+                      </m:e>
+                      <m:sup>
+                        <m:r>
+                          <a:rPr lang="en-US" b="0" i="1" baseline="0" noProof="0" smtClean="0">
+                            <a:latin typeface="Cambria Math" panose="02040503050406030204" pitchFamily="18" charset="0"/>
+                          </a:rPr>
+                          <m:t>𝑥</m:t>
+                        </m:r>
+                      </m:sup>
+                    </m:sSup>
+                  </m:oMath>
+                </a14:m>
+                <a:r>
+                  <a:rPr lang="en-US" baseline="0" noProof="0" dirty="0" smtClean="0"/>
+                  <a:t>.</a:t>
+                </a:r>
+              </a:p>
+              <a:p>
+                <a:pPr marL="171450" marR="0" indent="-171450" algn="l" defTabSz="914400" rtl="0" eaLnBrk="1" fontAlgn="auto" latinLnBrk="0" hangingPunct="1">
+                  <a:lnSpc>
+                    <a:spcPct val="100000"/>
+                  </a:lnSpc>
+                  <a:spcBef>
+                    <a:spcPts val="0"/>
+                  </a:spcBef>
+                  <a:spcAft>
+                    <a:spcPts val="0"/>
+                  </a:spcAft>
+                  <a:buClrTx/>
+                  <a:buSzTx/>
+                  <a:buFontTx/>
+                  <a:buChar char="-"/>
+                  <a:tabLst/>
+                  <a:defRPr/>
+                </a:pPr>
+                <a:r>
+                  <a:rPr lang="en-US" noProof="0" dirty="0" smtClean="0"/>
+                  <a:t>LR:</a:t>
+                </a:r>
+                <a:r>
+                  <a:rPr lang="en-US" baseline="0" noProof="0" dirty="0" smtClean="0"/>
+                  <a:t> standard L2 regularized LR classifier, does not adjust for confounding variables</a:t>
+                </a:r>
+              </a:p>
+              <a:p>
+                <a:pPr marL="171450" indent="-171450">
+                  <a:buFontTx/>
+                  <a:buChar char="-"/>
+                </a:pPr>
+                <a:r>
+                  <a:rPr lang="en-US" baseline="0" noProof="0" dirty="0" smtClean="0"/>
+                  <a:t>Others are ideas from social science implemented to compare to our method.</a:t>
+                </a:r>
+              </a:p>
+              <a:p>
+                <a:pPr marL="171450" indent="-171450">
+                  <a:buFontTx/>
+                  <a:buChar char="-"/>
+                </a:pPr>
+                <a:r>
+                  <a:rPr lang="en-US" baseline="0" noProof="0" dirty="0" smtClean="0"/>
+                  <a:t>Today, LR is the most used technique in text classification</a:t>
+                </a:r>
+              </a:p>
+              <a:p>
+                <a:pPr marL="0" indent="0">
+                  <a:buFontTx/>
+                  <a:buNone/>
+                </a:pPr>
+                <a:endParaRPr lang="en-US" baseline="0" noProof="0" dirty="0" smtClean="0"/>
+              </a:p>
+              <a:p>
+                <a:pPr marL="0" indent="0">
+                  <a:buFontTx/>
+                  <a:buNone/>
+                </a:pPr>
+                <a:endParaRPr lang="en-US" baseline="0" noProof="0" dirty="0" smtClean="0"/>
+              </a:p>
+              <a:p>
+                <a:pPr marL="0" indent="0">
+                  <a:buFontTx/>
+                  <a:buNone/>
+                </a:pPr>
+                <a:r>
+                  <a:rPr lang="en-US" baseline="0" noProof="0" dirty="0" smtClean="0"/>
+                  <a:t>Details:</a:t>
+                </a:r>
+              </a:p>
+              <a:p>
+                <a:pPr marL="171450" indent="-171450">
+                  <a:buFontTx/>
+                  <a:buChar char="-"/>
+                </a:pPr>
+                <a:r>
+                  <a:rPr lang="en-US" baseline="0" noProof="0" dirty="0" smtClean="0"/>
+                  <a:t>Subsampling remove bias by selecting a subsample of the training dataset where P(Y, Z) is uniformly distributed. This approach can discard many instances when one of the pair y/z has a very small number of instances</a:t>
+                </a:r>
+              </a:p>
+              <a:p>
+                <a:pPr marL="171450" indent="-171450">
+                  <a:buFontTx/>
+                  <a:buChar char="-"/>
+                </a:pPr>
+                <a:r>
+                  <a:rPr lang="en-US" baseline="0" noProof="0" dirty="0" smtClean="0"/>
+                  <a:t>Matching has been described previously: it consists in training a pair-wise classifier</a:t>
+                </a:r>
+              </a:p>
+              <a:p>
+                <a:pPr marL="171450" indent="-171450">
+                  <a:buFontTx/>
+                  <a:buChar char="-"/>
+                </a:pPr>
+                <a:r>
+                  <a:rPr lang="en-US" baseline="0" noProof="0" dirty="0" smtClean="0"/>
+                  <a:t>Sum out model the distribution P(Y,Z|X) at training time, and sum over z at testing time to compute P(Y|X)</a:t>
+                </a:r>
+                <a:endParaRPr lang="en-US" baseline="0" noProof="0" dirty="0" smtClean="0"/>
+              </a:p>
+            </p:txBody>
+          </p:sp>
+        </mc:Choice>
+        <mc:Fallback>
+          <p:sp>
+            <p:nvSpPr>
+              <p:cNvPr id="3" name="Notes Placeholder 2"/>
+              <p:cNvSpPr>
+                <a:spLocks noGrp="1"/>
+              </p:cNvSpPr>
+              <p:nvPr>
+                <p:ph type="body" idx="1"/>
+              </p:nvPr>
+            </p:nvSpPr>
+            <p:spPr/>
+            <p:txBody>
+              <a:bodyPr/>
+              <a:lstStyle/>
+              <a:p>
+                <a:pPr marL="171450" indent="-171450">
+                  <a:buFontTx/>
+                  <a:buChar char="-"/>
+                </a:pPr>
+                <a:r>
+                  <a:rPr lang="en-US" baseline="0" noProof="0" dirty="0" smtClean="0"/>
+                  <a:t>BA is the method we described before. BAZ10 is an improved method that leverages undertraining to improve accuracy. By setting the features encoding z to 10 instead of 1, we increase the importance of these features and therefore reduce the importance of other features and specifically features related to the confounder. It has the same effect as distinguishing between the coefficients for the term vector </a:t>
+                </a:r>
+                <a:r>
+                  <a:rPr lang="en-US" b="0" i="0" baseline="0" noProof="0" smtClean="0">
+                    <a:latin typeface="Cambria Math" panose="02040503050406030204" pitchFamily="18" charset="0"/>
+                  </a:rPr>
+                  <a:t>𝜃^𝑥</a:t>
+                </a:r>
+                <a:r>
+                  <a:rPr lang="en-US" baseline="0" noProof="0" dirty="0" smtClean="0"/>
+                  <a:t> and the coefficients (blue) for the confounder </a:t>
+                </a:r>
+                <a:r>
+                  <a:rPr lang="en-US" b="0" i="0" baseline="0" noProof="0" smtClean="0">
+                    <a:latin typeface="Cambria Math" panose="02040503050406030204" pitchFamily="18" charset="0"/>
+                  </a:rPr>
+                  <a:t>𝜃^𝑧</a:t>
+                </a:r>
+                <a:r>
+                  <a:rPr lang="en-US" baseline="0" noProof="0" dirty="0" smtClean="0"/>
+                  <a:t> (red) in the L2-regularized log-likelihood function where </a:t>
+                </a:r>
+                <a:r>
+                  <a:rPr lang="en-US" b="0" i="0" baseline="0" noProof="0" smtClean="0">
+                    <a:latin typeface="Cambria Math" panose="02040503050406030204" pitchFamily="18" charset="0"/>
+                  </a:rPr>
+                  <a:t>𝜆_𝑥</a:t>
+                </a:r>
+                <a:r>
+                  <a:rPr lang="en-US" baseline="0" noProof="0" dirty="0" smtClean="0"/>
+                  <a:t> and </a:t>
+                </a:r>
+                <a:r>
+                  <a:rPr lang="en-US" b="0" i="0" baseline="0" noProof="0" smtClean="0">
+                    <a:latin typeface="Cambria Math" panose="02040503050406030204" pitchFamily="18" charset="0"/>
+                  </a:rPr>
+                  <a:t>𝜆_𝑧</a:t>
+                </a:r>
+                <a:r>
+                  <a:rPr lang="en-US" baseline="0" noProof="0" dirty="0" smtClean="0"/>
+                  <a:t> control the regularization strength of the term coefficients and confounder coefficients. By setting </a:t>
+                </a:r>
+                <a:r>
+                  <a:rPr lang="en-US" b="0" i="0" baseline="0" noProof="0" smtClean="0">
+                    <a:latin typeface="Cambria Math" panose="02040503050406030204" pitchFamily="18" charset="0"/>
+                  </a:rPr>
+                  <a:t>𝜆_𝑧&lt;𝜆_𝑥</a:t>
+                </a:r>
+                <a:r>
+                  <a:rPr lang="en-US" baseline="0" noProof="0" dirty="0" smtClean="0"/>
+                  <a:t>, we allow the coefficients </a:t>
+                </a:r>
+                <a:r>
+                  <a:rPr lang="en-US" b="0" i="0" baseline="0" noProof="0" smtClean="0">
+                    <a:latin typeface="Cambria Math" panose="02040503050406030204" pitchFamily="18" charset="0"/>
+                  </a:rPr>
+                  <a:t>𝜃^𝑧</a:t>
+                </a:r>
+                <a:r>
+                  <a:rPr lang="en-US" baseline="0" noProof="0" dirty="0" smtClean="0"/>
+                  <a:t> to play a larger role in classification than </a:t>
+                </a:r>
+                <a:r>
+                  <a:rPr lang="en-US" b="0" i="0" baseline="0" noProof="0" smtClean="0">
+                    <a:latin typeface="Cambria Math" panose="02040503050406030204" pitchFamily="18" charset="0"/>
+                  </a:rPr>
+                  <a:t>𝜃^𝑥</a:t>
+                </a:r>
+                <a:r>
+                  <a:rPr lang="en-US" baseline="0" noProof="0" dirty="0" smtClean="0"/>
+                  <a:t>.</a:t>
+                </a:r>
+              </a:p>
+              <a:p>
+                <a:pPr marL="171450" marR="0" indent="-171450" algn="l" defTabSz="914400" rtl="0" eaLnBrk="1" fontAlgn="auto" latinLnBrk="0" hangingPunct="1">
+                  <a:lnSpc>
+                    <a:spcPct val="100000"/>
+                  </a:lnSpc>
+                  <a:spcBef>
+                    <a:spcPts val="0"/>
+                  </a:spcBef>
+                  <a:spcAft>
+                    <a:spcPts val="0"/>
+                  </a:spcAft>
+                  <a:buClrTx/>
+                  <a:buSzTx/>
+                  <a:buFontTx/>
+                  <a:buChar char="-"/>
+                  <a:tabLst/>
+                  <a:defRPr/>
+                </a:pPr>
+                <a:r>
+                  <a:rPr lang="en-US" noProof="0" dirty="0" smtClean="0"/>
+                  <a:t>LR:</a:t>
+                </a:r>
+                <a:r>
+                  <a:rPr lang="en-US" baseline="0" noProof="0" dirty="0" smtClean="0"/>
+                  <a:t> standard L2 regularized LR classifier, does not adjust for confounding variables</a:t>
+                </a:r>
+              </a:p>
+              <a:p>
+                <a:pPr marL="171450" indent="-171450">
+                  <a:buFontTx/>
+                  <a:buChar char="-"/>
+                </a:pPr>
+                <a:r>
+                  <a:rPr lang="en-US" baseline="0" noProof="0" dirty="0" smtClean="0"/>
+                  <a:t>Others are ideas from social science implemented to compare to our method.</a:t>
+                </a:r>
+              </a:p>
+              <a:p>
+                <a:pPr marL="171450" indent="-171450">
+                  <a:buFontTx/>
+                  <a:buChar char="-"/>
+                </a:pPr>
+                <a:r>
+                  <a:rPr lang="en-US" baseline="0" noProof="0" dirty="0" smtClean="0"/>
+                  <a:t>Today, LR is the most used technique in text classification</a:t>
+                </a:r>
+              </a:p>
+              <a:p>
+                <a:pPr marL="0" indent="0">
+                  <a:buFontTx/>
+                  <a:buNone/>
+                </a:pPr>
+                <a:endParaRPr lang="en-US" baseline="0" noProof="0" dirty="0" smtClean="0"/>
+              </a:p>
+              <a:p>
+                <a:pPr marL="0" indent="0">
+                  <a:buFontTx/>
+                  <a:buNone/>
+                </a:pPr>
+                <a:endParaRPr lang="en-US" baseline="0" noProof="0" dirty="0" smtClean="0"/>
+              </a:p>
+              <a:p>
+                <a:pPr marL="0" indent="0">
+                  <a:buFontTx/>
+                  <a:buNone/>
+                </a:pPr>
+                <a:r>
+                  <a:rPr lang="en-US" baseline="0" noProof="0" dirty="0" smtClean="0"/>
+                  <a:t>Details:</a:t>
+                </a:r>
+              </a:p>
+              <a:p>
+                <a:pPr marL="171450" indent="-171450">
+                  <a:buFontTx/>
+                  <a:buChar char="-"/>
+                </a:pPr>
+                <a:r>
+                  <a:rPr lang="en-US" baseline="0" noProof="0" dirty="0" smtClean="0"/>
+                  <a:t>Subsampling remove bias by selecting a subsample of the training dataset where P(Y, Z) is uniformly distributed. This approach can discard many instances when one of the pair y/z has a very small number of instances</a:t>
+                </a:r>
+              </a:p>
+              <a:p>
+                <a:pPr marL="171450" indent="-171450">
+                  <a:buFontTx/>
+                  <a:buChar char="-"/>
+                </a:pPr>
+                <a:r>
+                  <a:rPr lang="en-US" baseline="0" noProof="0" dirty="0" smtClean="0"/>
+                  <a:t>Matching has been described previously: it consists in training a pair-wise classifier</a:t>
+                </a:r>
+              </a:p>
+              <a:p>
+                <a:pPr marL="171450" indent="-171450">
+                  <a:buFontTx/>
+                  <a:buChar char="-"/>
+                </a:pPr>
+                <a:r>
+                  <a:rPr lang="en-US" baseline="0" noProof="0" dirty="0" smtClean="0"/>
+                  <a:t>Sum out model the distribution P(Y,Z|X) at training time, and sum over z at testing time to compute P(Y|X)</a:t>
+                </a:r>
+                <a:endParaRPr lang="en-US" baseline="0" noProof="0" dirty="0" smtClean="0"/>
+              </a:p>
+            </p:txBody>
+          </p:sp>
+        </mc:Fallback>
+      </mc:AlternateContent>
       <p:sp>
         <p:nvSpPr>
           <p:cNvPr id="4" name="Slide Number Placeholder 3"/>
@@ -5811,8 +5805,13 @@
             </a:r>
             <a:r>
               <a:rPr lang="fr-FR" baseline="0" dirty="0" smtClean="0"/>
-              <a:t> set.</a:t>
-            </a:r>
+              <a:t> set</a:t>
+            </a:r>
+            <a:r>
+              <a:rPr lang="fr-FR" baseline="0" dirty="0" smtClean="0"/>
+              <a:t>.</a:t>
+            </a:r>
+            <a:endParaRPr lang="fr-FR" baseline="0" dirty="0" smtClean="0"/>
           </a:p>
           <a:p>
             <a:pPr marL="171450" indent="-171450">
@@ -5905,6 +5904,106 @@
               <a:buChar char="-"/>
             </a:pPr>
             <a:r>
+              <a:rPr lang="fr-FR" baseline="0" dirty="0" smtClean="0"/>
+              <a:t>First of all, </a:t>
+            </a:r>
+            <a:r>
+              <a:rPr lang="fr-FR" baseline="0" dirty="0" err="1" smtClean="0"/>
+              <a:t>we</a:t>
+            </a:r>
+            <a:r>
+              <a:rPr lang="fr-FR" baseline="0" dirty="0" smtClean="0"/>
+              <a:t> </a:t>
+            </a:r>
+            <a:r>
+              <a:rPr lang="fr-FR" baseline="0" dirty="0" err="1" smtClean="0"/>
+              <a:t>can</a:t>
+            </a:r>
+            <a:r>
+              <a:rPr lang="fr-FR" baseline="0" dirty="0" smtClean="0"/>
+              <a:t> observe </a:t>
+            </a:r>
+            <a:r>
+              <a:rPr lang="fr-FR" baseline="0" dirty="0" err="1" smtClean="0"/>
+              <a:t>that</a:t>
+            </a:r>
+            <a:r>
+              <a:rPr lang="fr-FR" baseline="0" dirty="0" smtClean="0"/>
+              <a:t> LR </a:t>
+            </a:r>
+            <a:r>
+              <a:rPr lang="fr-FR" baseline="0" dirty="0" err="1" smtClean="0"/>
+              <a:t>is</a:t>
+            </a:r>
+            <a:r>
+              <a:rPr lang="fr-FR" baseline="0" dirty="0" smtClean="0"/>
+              <a:t> </a:t>
+            </a:r>
+            <a:r>
+              <a:rPr lang="fr-FR" baseline="0" dirty="0" err="1" smtClean="0"/>
+              <a:t>greatly</a:t>
+            </a:r>
+            <a:r>
+              <a:rPr lang="fr-FR" baseline="0" dirty="0" smtClean="0"/>
+              <a:t> </a:t>
+            </a:r>
+            <a:r>
+              <a:rPr lang="fr-FR" baseline="0" dirty="0" err="1" smtClean="0"/>
+              <a:t>affected</a:t>
+            </a:r>
+            <a:r>
+              <a:rPr lang="fr-FR" baseline="0" dirty="0" smtClean="0"/>
+              <a:t> by the </a:t>
+            </a:r>
+            <a:r>
+              <a:rPr lang="fr-FR" baseline="0" dirty="0" err="1" smtClean="0"/>
+              <a:t>correlation</a:t>
+            </a:r>
+            <a:r>
+              <a:rPr lang="fr-FR" baseline="0" dirty="0" smtClean="0"/>
+              <a:t> </a:t>
+            </a:r>
+            <a:r>
+              <a:rPr lang="fr-FR" baseline="0" dirty="0" err="1" smtClean="0"/>
+              <a:t>difference</a:t>
+            </a:r>
+            <a:r>
+              <a:rPr lang="fr-FR" baseline="0" dirty="0" smtClean="0"/>
+              <a:t> and </a:t>
+            </a:r>
+            <a:r>
+              <a:rPr lang="fr-FR" baseline="0" dirty="0" err="1" smtClean="0"/>
+              <a:t>it</a:t>
+            </a:r>
+            <a:r>
+              <a:rPr lang="fr-FR" baseline="0" dirty="0" smtClean="0"/>
+              <a:t> </a:t>
+            </a:r>
+            <a:r>
+              <a:rPr lang="fr-FR" baseline="0" dirty="0" err="1" smtClean="0"/>
+              <a:t>performs</a:t>
+            </a:r>
+            <a:r>
+              <a:rPr lang="fr-FR" baseline="0" dirty="0" smtClean="0"/>
+              <a:t> </a:t>
+            </a:r>
+            <a:r>
+              <a:rPr lang="fr-FR" baseline="0" dirty="0" err="1" smtClean="0"/>
+              <a:t>poorly</a:t>
+            </a:r>
+            <a:r>
+              <a:rPr lang="fr-FR" baseline="0" dirty="0" smtClean="0"/>
+              <a:t> in the </a:t>
+            </a:r>
+            <a:r>
+              <a:rPr lang="fr-FR" baseline="0" dirty="0" err="1" smtClean="0"/>
+              <a:t>extreme</a:t>
+            </a:r>
+            <a:r>
+              <a:rPr lang="fr-FR" baseline="0" dirty="0" smtClean="0"/>
+              <a:t> cases. </a:t>
+            </a:r>
+            <a:r>
               <a:rPr lang="fr-FR" baseline="0" dirty="0" err="1" smtClean="0"/>
               <a:t>We</a:t>
             </a:r>
@@ -5930,11 +6029,39 @@
             </a:r>
             <a:r>
               <a:rPr lang="fr-FR" baseline="0" dirty="0" err="1" smtClean="0"/>
+              <a:t>is</a:t>
+            </a:r>
+            <a:r>
+              <a:rPr lang="fr-FR" baseline="0" dirty="0" smtClean="0"/>
+              <a:t> </a:t>
+            </a:r>
+            <a:r>
+              <a:rPr lang="fr-FR" baseline="0" dirty="0" err="1" smtClean="0"/>
+              <a:t>much</a:t>
+            </a:r>
+            <a:r>
+              <a:rPr lang="fr-FR" baseline="0" dirty="0" smtClean="0"/>
+              <a:t> more </a:t>
+            </a:r>
+            <a:r>
+              <a:rPr lang="fr-FR" baseline="0" dirty="0" err="1" smtClean="0"/>
+              <a:t>robust</a:t>
+            </a:r>
+            <a:r>
+              <a:rPr lang="fr-FR" baseline="0" dirty="0" smtClean="0"/>
+              <a:t> and </a:t>
+            </a:r>
+            <a:r>
+              <a:rPr lang="fr-FR" baseline="0" dirty="0" err="1" smtClean="0"/>
               <a:t>outperforms</a:t>
             </a:r>
             <a:r>
               <a:rPr lang="fr-FR" baseline="0" dirty="0" smtClean="0"/>
-              <a:t> the </a:t>
+              <a:t> </a:t>
+            </a:r>
+            <a:r>
+              <a:rPr lang="fr-FR" baseline="0" dirty="0" smtClean="0"/>
+              <a:t>the </a:t>
             </a:r>
             <a:r>
               <a:rPr lang="fr-FR" baseline="0" dirty="0" err="1" smtClean="0"/>
@@ -5958,130 +6085,25 @@
             </a:r>
             <a:r>
               <a:rPr lang="fr-FR" baseline="0" dirty="0" smtClean="0"/>
-              <a:t> case by at least 10 points.</a:t>
-            </a:r>
-          </a:p>
-          <a:p>
-            <a:pPr marL="171450" indent="-171450">
-              <a:buFontTx/>
-              <a:buChar char="-"/>
-            </a:pPr>
-            <a:r>
-              <a:rPr lang="fr-FR" baseline="0" dirty="0" smtClean="0"/>
-              <a:t>In the </a:t>
-            </a:r>
-            <a:r>
-              <a:rPr lang="fr-FR" baseline="0" dirty="0" err="1" smtClean="0"/>
-              <a:t>experiments</a:t>
-            </a:r>
-            <a:r>
-              <a:rPr lang="fr-FR" baseline="0" dirty="0" smtClean="0"/>
-              <a:t> </a:t>
-            </a:r>
-            <a:r>
-              <a:rPr lang="fr-FR" baseline="0" dirty="0" err="1" smtClean="0"/>
-              <a:t>where</a:t>
-            </a:r>
-            <a:r>
-              <a:rPr lang="fr-FR" baseline="0" dirty="0" smtClean="0"/>
-              <a:t> the </a:t>
-            </a:r>
-            <a:r>
-              <a:rPr lang="fr-FR" baseline="0" dirty="0" err="1" smtClean="0"/>
-              <a:t>confounding</a:t>
-            </a:r>
-            <a:r>
-              <a:rPr lang="fr-FR" baseline="0" dirty="0" smtClean="0"/>
-              <a:t> </a:t>
-            </a:r>
-            <a:r>
-              <a:rPr lang="fr-FR" baseline="0" dirty="0" err="1" smtClean="0"/>
-              <a:t>bias</a:t>
-            </a:r>
-            <a:r>
-              <a:rPr lang="fr-FR" baseline="0" dirty="0" smtClean="0"/>
-              <a:t> </a:t>
-            </a:r>
-            <a:r>
-              <a:rPr lang="fr-FR" baseline="0" dirty="0" err="1" smtClean="0"/>
-              <a:t>is</a:t>
-            </a:r>
-            <a:r>
-              <a:rPr lang="fr-FR" baseline="0" dirty="0" smtClean="0"/>
-              <a:t> the </a:t>
-            </a:r>
-            <a:r>
-              <a:rPr lang="fr-FR" baseline="0" dirty="0" err="1" smtClean="0"/>
-              <a:t>same</a:t>
-            </a:r>
-            <a:r>
-              <a:rPr lang="fr-FR" baseline="0" dirty="0" smtClean="0"/>
-              <a:t> in the training and the </a:t>
-            </a:r>
-            <a:r>
-              <a:rPr lang="fr-FR" baseline="0" dirty="0" err="1" smtClean="0"/>
-              <a:t>testing</a:t>
-            </a:r>
-            <a:r>
-              <a:rPr lang="fr-FR" baseline="0" dirty="0" smtClean="0"/>
-              <a:t> sets (middle area), BAZ10 </a:t>
-            </a:r>
-            <a:r>
-              <a:rPr lang="fr-FR" baseline="0" dirty="0" err="1" smtClean="0"/>
-              <a:t>is</a:t>
-            </a:r>
-            <a:r>
-              <a:rPr lang="fr-FR" baseline="0" dirty="0" smtClean="0"/>
-              <a:t> </a:t>
-            </a:r>
-            <a:r>
-              <a:rPr lang="fr-FR" baseline="0" dirty="0" err="1" smtClean="0"/>
-              <a:t>outperformed</a:t>
-            </a:r>
-            <a:r>
-              <a:rPr lang="fr-FR" baseline="0" dirty="0" smtClean="0"/>
-              <a:t> by LR but </a:t>
-            </a:r>
-            <a:r>
-              <a:rPr lang="fr-FR" baseline="0" dirty="0" err="1" smtClean="0"/>
-              <a:t>is</a:t>
-            </a:r>
-            <a:r>
-              <a:rPr lang="fr-FR" baseline="0" dirty="0" smtClean="0"/>
-              <a:t> </a:t>
-            </a:r>
-            <a:r>
-              <a:rPr lang="fr-FR" baseline="0" dirty="0" err="1" smtClean="0"/>
-              <a:t>only</a:t>
-            </a:r>
-            <a:r>
-              <a:rPr lang="fr-FR" baseline="0" dirty="0" smtClean="0"/>
-              <a:t> </a:t>
-            </a:r>
-            <a:r>
-              <a:rPr lang="fr-FR" baseline="0" dirty="0" err="1" smtClean="0"/>
-              <a:t>two</a:t>
-            </a:r>
-            <a:r>
-              <a:rPr lang="fr-FR" baseline="0" dirty="0" smtClean="0"/>
-              <a:t> points </a:t>
-            </a:r>
-            <a:r>
-              <a:rPr lang="fr-FR" baseline="0" dirty="0" err="1" smtClean="0"/>
-              <a:t>lower</a:t>
-            </a:r>
-            <a:r>
-              <a:rPr lang="fr-FR" baseline="0" dirty="0" smtClean="0"/>
-              <a:t> in </a:t>
-            </a:r>
-            <a:r>
-              <a:rPr lang="fr-FR" baseline="0" dirty="0" err="1" smtClean="0"/>
-              <a:t>accuracy</a:t>
-            </a:r>
-            <a:r>
-              <a:rPr lang="fr-FR" baseline="0" dirty="0" smtClean="0"/>
-              <a:t>.</a:t>
-            </a:r>
+              <a:t> case by at least 10 </a:t>
+            </a:r>
+            <a:r>
+              <a:rPr lang="fr-FR" baseline="0" dirty="0" smtClean="0"/>
+              <a:t>points </a:t>
+            </a:r>
+            <a:r>
+              <a:rPr lang="en-US" sz="1200" b="0" i="0" kern="1200" dirty="0" smtClean="0">
+                <a:solidFill>
+                  <a:schemeClr val="tx1"/>
+                </a:solidFill>
+                <a:effectLst/>
+                <a:latin typeface="+mn-lt"/>
+                <a:ea typeface="+mn-ea"/>
+                <a:cs typeface="+mn-cs"/>
+              </a:rPr>
+              <a:t>with a minimal sacrifice to accuracy when there is no change in confounder relationship (middle area).</a:t>
+            </a:r>
+            <a:endParaRPr lang="fr-FR" baseline="0" dirty="0" smtClean="0"/>
           </a:p>
         </p:txBody>
       </p:sp>
@@ -6179,11 +6201,11 @@
             </a:r>
             <a:r>
               <a:rPr lang="en-US" baseline="0" dirty="0" smtClean="0"/>
-              <a:t>) is </a:t>
-            </a:r>
-            <a:r>
-              <a:rPr lang="en-US" baseline="0" dirty="0" err="1" smtClean="0"/>
-              <a:t>skewed.s</a:t>
+              <a:t>) is skewed</a:t>
+            </a:r>
+            <a:r>
+              <a:rPr lang="en-US" baseline="0" dirty="0" smtClean="0"/>
+              <a:t>.</a:t>
             </a:r>
             <a:endParaRPr lang="en-US" dirty="0"/>
           </a:p>
@@ -6909,7 +6931,23 @@
             </a:pPr>
             <a:r>
               <a:rPr lang="en-US" baseline="0" noProof="0" dirty="0" smtClean="0"/>
-              <a:t>Second, we plot the coefficient values for the ten most predictive features of the label (left), and for the ten most predictive features of the confounder (right). (using chi 2 test that compute dependency)</a:t>
+              <a:t>We plot </a:t>
+            </a:r>
+            <a:r>
+              <a:rPr lang="en-US" baseline="0" noProof="0" dirty="0" smtClean="0"/>
+              <a:t>the coefficient values for the ten most predictive features of </a:t>
+            </a:r>
+            <a:r>
+              <a:rPr lang="en-US" baseline="0" noProof="0" dirty="0" smtClean="0"/>
+              <a:t>the confounder. </a:t>
+            </a:r>
+            <a:r>
+              <a:rPr lang="en-US" baseline="0" noProof="0" dirty="0" smtClean="0"/>
+              <a:t>(using chi 2 test that compute dependency</a:t>
+            </a:r>
+            <a:r>
+              <a:rPr lang="en-US" baseline="0" noProof="0" dirty="0" smtClean="0"/>
+              <a:t>)</a:t>
             </a:r>
           </a:p>
           <a:p>
@@ -6919,25 +6957,19 @@
             </a:pPr>
             <a:r>
               <a:rPr lang="en-US" baseline="0" noProof="0" dirty="0" smtClean="0"/>
-              <a:t>We see that even though the location-related features coefficients decrease a little, they stay important.</a:t>
-            </a:r>
-          </a:p>
-          <a:p>
-            <a:pPr marL="628650" lvl="1" indent="-171450">
-              <a:buFontTx/>
-              <a:buChar char="-"/>
-            </a:pPr>
+              <a:t> Even though </a:t>
+            </a:r>
             <a:r>
               <a:rPr lang="en-US" baseline="0" noProof="0" dirty="0" smtClean="0"/>
-              <a:t>However, even though the gender-</a:t>
-            </a:r>
-            <a:r>
-              <a:rPr lang="en-US" baseline="0" noProof="0" dirty="0" err="1" smtClean="0"/>
-              <a:t>realted</a:t>
+              <a:t>the </a:t>
             </a:r>
             <a:r>
               <a:rPr lang="en-US" baseline="0" noProof="0" dirty="0" smtClean="0"/>
-              <a:t> features had small coefficients in the initial classifier (LR), they are driven down close to 0 by BAZ10.</a:t>
+              <a:t>gender-related </a:t>
+            </a:r>
+            <a:r>
+              <a:rPr lang="en-US" baseline="0" noProof="0" dirty="0" smtClean="0"/>
+              <a:t>features had small coefficients in the initial classifier (LR), they are driven down close to 0 by BAZ10.</a:t>
             </a:r>
           </a:p>
           <a:p>
@@ -7250,7 +7282,15 @@
             </a:r>
             <a:r>
               <a:rPr lang="fr-FR" baseline="0" dirty="0" smtClean="0"/>
-              <a:t> in 1961 and </a:t>
+              <a:t> in 1961 by </a:t>
+            </a:r>
+            <a:r>
+              <a:rPr lang="fr-FR" baseline="0" dirty="0" err="1" smtClean="0"/>
+              <a:t>Maron</a:t>
+            </a:r>
+            <a:r>
+              <a:rPr lang="fr-FR" baseline="0" dirty="0" smtClean="0"/>
+              <a:t> and </a:t>
             </a:r>
             <a:r>
               <a:rPr lang="fr-FR" baseline="0" dirty="0" err="1" smtClean="0"/>
@@ -7859,7 +7899,7 @@
             </a:r>
             <a:r>
               <a:rPr lang="en-US" baseline="0" dirty="0" smtClean="0"/>
-              <a:t> we ran an experiment where we try to predict the location of a Twitter user (NY or LA) based on her tweets. But in this case, the dataset is such that male is highly correlated with NY and female is highly correlated with LA.</a:t>
+              <a:t> we ran an experiment where we try to predict the location of a Twitter user (NY or LA) based on her tweets. But in this case, the dataset is such that male is highly correlated with LA and female is highly correlated with NY. Such a situation can happen because training dataset are typically small and this would happen without us knowing it.</a:t>
             </a:r>
           </a:p>
           <a:p>
@@ -7979,7 +8019,7 @@
             </a:r>
             <a:r>
               <a:rPr lang="en-US" baseline="0" dirty="0" smtClean="0"/>
-              <a:t> we ran an experiment where we try to predict the location of a Twitter user (NY or LA) based on her tweets. But in this case, the dataset is such that male is highly correlated with NY and female is highly correlated with LA.</a:t>
+              <a:t> we ran an experiment where we try to predict the location of a Twitter user (NY or LA) based on her tweets. But in this case, the dataset is such that male is highly correlated with LA and female is highly correlated with NY. Such a situation can happen because training dataset are typically small and this would happen without us knowing it.</a:t>
             </a:r>
           </a:p>
           <a:p>
@@ -9283,99 +9323,13 @@
           <a:p>
             <a:r>
               <a:rPr lang="en-US" sz="1200" dirty="0" smtClean="0"/>
-              <a:t>We focus on the problem where the relation between the confounder Z and the target Y varies: </a:t>
-            </a:r>
-          </a:p>
-          <a:p>
-            <a:pPr marL="0" marR="0" lvl="0" indent="0" algn="l" defTabSz="914400" rtl="0" eaLnBrk="1" fontAlgn="auto" latinLnBrk="0" hangingPunct="1">
-              <a:lnSpc>
-                <a:spcPct val="100000"/>
-              </a:lnSpc>
-              <a:spcBef>
-                <a:spcPts val="0"/>
-              </a:spcBef>
-              <a:spcAft>
-                <a:spcPts val="0"/>
-              </a:spcAft>
-              <a:buClrTx/>
-              <a:buSzTx/>
-              <a:buFontTx/>
-              <a:buNone/>
-              <a:tabLst/>
-              <a:defRPr/>
-            </a:pPr>
-            <a:r>
-              <a:rPr lang="fr-FR" baseline="0" dirty="0" err="1" smtClean="0"/>
-              <a:t>Existing</a:t>
-            </a:r>
-            <a:r>
-              <a:rPr lang="fr-FR" baseline="0" dirty="0" smtClean="0"/>
-              <a:t> </a:t>
-            </a:r>
-            <a:r>
-              <a:rPr lang="fr-FR" baseline="0" dirty="0" err="1" smtClean="0"/>
-              <a:t>approaches</a:t>
-            </a:r>
-            <a:r>
-              <a:rPr lang="fr-FR" baseline="0" dirty="0" smtClean="0"/>
-              <a:t> are not </a:t>
-            </a:r>
-            <a:r>
-              <a:rPr lang="fr-FR" baseline="0" dirty="0" err="1" smtClean="0"/>
-              <a:t>practical</a:t>
-            </a:r>
-            <a:r>
-              <a:rPr lang="fr-FR" baseline="0" dirty="0" smtClean="0"/>
-              <a:t> in </a:t>
-            </a:r>
-            <a:r>
-              <a:rPr lang="fr-FR" baseline="0" dirty="0" err="1" smtClean="0"/>
-              <a:t>text</a:t>
-            </a:r>
-            <a:r>
-              <a:rPr lang="fr-FR" baseline="0" dirty="0" smtClean="0"/>
-              <a:t> </a:t>
-            </a:r>
-            <a:r>
-              <a:rPr lang="fr-FR" baseline="0" dirty="0" err="1" smtClean="0"/>
-              <a:t>domains</a:t>
-            </a:r>
-            <a:r>
-              <a:rPr lang="fr-FR" baseline="0" dirty="0" smtClean="0"/>
-              <a:t> </a:t>
-            </a:r>
-            <a:r>
-              <a:rPr lang="fr-FR" baseline="0" dirty="0" err="1" smtClean="0"/>
-              <a:t>with</a:t>
-            </a:r>
-            <a:r>
-              <a:rPr lang="fr-FR" baseline="0" dirty="0" smtClean="0"/>
-              <a:t> </a:t>
-            </a:r>
-            <a:r>
-              <a:rPr lang="fr-FR" baseline="0" dirty="0" err="1" smtClean="0"/>
-              <a:t>tens</a:t>
-            </a:r>
-            <a:r>
-              <a:rPr lang="fr-FR" baseline="0" dirty="0" smtClean="0"/>
-              <a:t> of </a:t>
-            </a:r>
-            <a:r>
-              <a:rPr lang="fr-FR" baseline="0" dirty="0" err="1" smtClean="0"/>
-              <a:t>thousands</a:t>
-            </a:r>
-            <a:r>
-              <a:rPr lang="fr-FR" baseline="0" dirty="0" smtClean="0"/>
-              <a:t> of </a:t>
-            </a:r>
-            <a:r>
-              <a:rPr lang="fr-FR" baseline="0" dirty="0" err="1" smtClean="0"/>
-              <a:t>features</a:t>
-            </a:r>
-            <a:r>
-              <a:rPr lang="fr-FR" baseline="0" dirty="0" smtClean="0"/>
-              <a:t>.</a:t>
-            </a:r>
+              <a:t>We focus on the problem where the relation between the confounder Z and the target Y varies</a:t>
+            </a:r>
+            <a:r>
+              <a:rPr lang="en-US" sz="1200" baseline="0" dirty="0" smtClean="0"/>
+              <a:t> and we don’t know of any work that has been focusing on this problem in text classification.</a:t>
+            </a:r>
+            <a:endParaRPr lang="fr-FR" baseline="0" dirty="0" smtClean="0"/>
           </a:p>
           <a:p>
             <a:endParaRPr lang="en-US" sz="1200" dirty="0" smtClean="0"/>
@@ -9999,24 +9953,12 @@
                   <a:buChar char="-"/>
                 </a:pPr>
                 <a:r>
+                  <a:rPr lang="fr-FR" baseline="0" dirty="0" smtClean="0"/>
+                  <a:t>In </a:t>
+                </a:r>
+                <a:r>
                   <a:rPr lang="fr-FR" baseline="0" dirty="0" err="1" smtClean="0"/>
-                  <a:t>E.g</a:t>
-                </a:r>
-                <a:r>
-                  <a:rPr lang="fr-FR" baseline="0" dirty="0" smtClean="0"/>
-                  <a:t>: public </a:t>
-                </a:r>
-                <a:r>
-                  <a:rPr lang="fr-FR" baseline="0" dirty="0" err="1" smtClean="0"/>
-                  <a:t>health</a:t>
-                </a:r>
-                <a:r>
-                  <a:rPr lang="fr-FR" baseline="0" dirty="0" smtClean="0"/>
-                  <a:t> setting: y </a:t>
-                </a:r>
-                <a:r>
-                  <a:rPr lang="fr-FR" baseline="0" dirty="0" err="1" smtClean="0"/>
-                  <a:t>may</a:t>
+                  <a:t>our</a:t>
                 </a:r>
                 <a:r>
                   <a:rPr lang="fr-FR" baseline="0" dirty="0" smtClean="0"/>
@@ -10024,7 +9966,7 @@
                 </a:r>
                 <a:r>
                   <a:rPr lang="fr-FR" baseline="0" dirty="0" err="1" smtClean="0"/>
-                  <a:t>be</a:t>
+                  <a:t>previous</a:t>
                 </a:r>
                 <a:r>
                   <a:rPr lang="fr-FR" baseline="0" dirty="0" smtClean="0"/>
@@ -10032,7 +9974,15 @@
                 </a:r>
                 <a:r>
                   <a:rPr lang="fr-FR" baseline="0" dirty="0" err="1" smtClean="0"/>
-                  <a:t>health</a:t>
+                  <a:t>example</a:t>
+                </a:r>
+                <a:r>
+                  <a:rPr lang="fr-FR" baseline="0" dirty="0" smtClean="0"/>
+                  <a:t>, </a:t>
+                </a:r>
+                <a:r>
+                  <a:rPr lang="fr-FR" baseline="0" dirty="0" err="1" smtClean="0"/>
+                  <a:t>we</a:t>
                 </a:r>
                 <a:r>
                   <a:rPr lang="fr-FR" baseline="0" dirty="0" smtClean="0"/>
@@ -10040,15 +9990,7 @@
                 </a:r>
                 <a:r>
                   <a:rPr lang="fr-FR" baseline="0" dirty="0" err="1" smtClean="0"/>
-                  <a:t>status</a:t>
-                </a:r>
-                <a:r>
-                  <a:rPr lang="fr-FR" baseline="0" dirty="0" smtClean="0"/>
-                  <a:t>, x a </a:t>
-                </a:r>
-                <a:r>
-                  <a:rPr lang="fr-FR" baseline="0" dirty="0" err="1" smtClean="0"/>
-                  <a:t>term</a:t>
+                  <a:t>were</a:t>
                 </a:r>
                 <a:r>
                   <a:rPr lang="fr-FR" baseline="0" dirty="0" smtClean="0"/>
@@ -10056,19 +9998,67 @@
                 </a:r>
                 <a:r>
                   <a:rPr lang="fr-FR" baseline="0" dirty="0" err="1" smtClean="0"/>
-                  <a:t>vector</a:t>
+                  <a:t>trying</a:t>
                 </a:r>
                 <a:r>
                   <a:rPr lang="fr-FR" baseline="0" dirty="0" smtClean="0"/>
-                  <a:t> for online messages, and z a </a:t>
+                  <a:t> to label the position of a Twitter user </a:t>
                 </a:r>
                 <a:r>
                   <a:rPr lang="fr-FR" baseline="0" dirty="0" err="1" smtClean="0"/>
-                  <a:t>demographic</a:t>
+                  <a:t>given</a:t>
                 </a:r>
                 <a:r>
                   <a:rPr lang="fr-FR" baseline="0" dirty="0" smtClean="0"/>
-                  <a:t> variable</a:t>
+                  <a:t> </a:t>
+                </a:r>
+                <a:r>
+                  <a:rPr lang="fr-FR" baseline="0" dirty="0" err="1" smtClean="0"/>
+                  <a:t>his</a:t>
+                </a:r>
+                <a:r>
+                  <a:rPr lang="fr-FR" baseline="0" dirty="0" smtClean="0"/>
+                  <a:t>/</a:t>
+                </a:r>
+                <a:r>
+                  <a:rPr lang="fr-FR" baseline="0" dirty="0" err="1" smtClean="0"/>
+                  <a:t>her</a:t>
+                </a:r>
+                <a:r>
+                  <a:rPr lang="fr-FR" baseline="0" dirty="0" smtClean="0"/>
+                  <a:t> tweets. And the </a:t>
+                </a:r>
+                <a:r>
+                  <a:rPr lang="fr-FR" baseline="0" dirty="0" err="1" smtClean="0"/>
+                  <a:t>confounder</a:t>
+                </a:r>
+                <a:r>
+                  <a:rPr lang="fr-FR" baseline="0" dirty="0" smtClean="0"/>
+                  <a:t> variable </a:t>
+                </a:r>
+                <a:r>
+                  <a:rPr lang="fr-FR" baseline="0" dirty="0" err="1" smtClean="0"/>
+                  <a:t>was</a:t>
+                </a:r>
+                <a:r>
+                  <a:rPr lang="fr-FR" baseline="0" dirty="0" smtClean="0"/>
+                  <a:t> the </a:t>
+                </a:r>
+                <a:r>
+                  <a:rPr lang="fr-FR" baseline="0" dirty="0" err="1" smtClean="0"/>
+                  <a:t>user’s</a:t>
+                </a:r>
+                <a:r>
+                  <a:rPr lang="fr-FR" baseline="0" dirty="0" smtClean="0"/>
+                  <a:t> </a:t>
+                </a:r>
+                <a:r>
+                  <a:rPr lang="fr-FR" baseline="0" dirty="0" err="1" smtClean="0"/>
+                  <a:t>gender</a:t>
+                </a:r>
+                <a:r>
+                  <a:rPr lang="fr-FR" baseline="0" dirty="0" smtClean="0"/>
+                  <a:t>.</a:t>
                 </a:r>
               </a:p>
               <a:p>
@@ -11619,87 +11609,6 @@
             <a:r>
               <a:rPr lang="fr-FR" baseline="0" dirty="0" err="1" smtClean="0"/>
               <a:t>confounder</a:t>
-            </a:r>
-            <a:r>
-              <a:rPr lang="fr-FR" baseline="0" dirty="0" smtClean="0"/>
-              <a:t>.</a:t>
-            </a:r>
-          </a:p>
-          <a:p>
-            <a:pPr marL="171450" lvl="0" indent="-171450">
-              <a:buFontTx/>
-              <a:buChar char="-"/>
-            </a:pPr>
-            <a:endParaRPr lang="fr-FR" baseline="0" dirty="0" smtClean="0"/>
-          </a:p>
-          <a:p>
-            <a:pPr marL="171450" lvl="0" indent="-171450">
-              <a:buFontTx/>
-              <a:buChar char="-"/>
-            </a:pPr>
-            <a:r>
-              <a:rPr lang="fr-FR" baseline="0" dirty="0" smtClean="0"/>
-              <a:t>By default, </a:t>
-            </a:r>
-            <a:r>
-              <a:rPr lang="fr-FR" baseline="0" dirty="0" err="1" smtClean="0"/>
-              <a:t>we</a:t>
-            </a:r>
-            <a:r>
-              <a:rPr lang="fr-FR" baseline="0" dirty="0" smtClean="0"/>
-              <a:t> set v0 = 0 and v1 = 1 but </a:t>
-            </a:r>
-            <a:r>
-              <a:rPr lang="fr-FR" baseline="0" dirty="0" err="1" smtClean="0"/>
-              <a:t>we</a:t>
-            </a:r>
-            <a:r>
-              <a:rPr lang="fr-FR" baseline="0" dirty="0" smtClean="0"/>
-              <a:t> show in the </a:t>
-            </a:r>
-            <a:r>
-              <a:rPr lang="fr-FR" baseline="0" dirty="0" err="1" smtClean="0"/>
-              <a:t>paper</a:t>
-            </a:r>
-            <a:r>
-              <a:rPr lang="fr-FR" baseline="0" dirty="0" smtClean="0"/>
-              <a:t> how setting a value of v1=10 </a:t>
-            </a:r>
-            <a:r>
-              <a:rPr lang="fr-FR" baseline="0" dirty="0" err="1" smtClean="0"/>
-              <a:t>increases</a:t>
-            </a:r>
-            <a:r>
-              <a:rPr lang="fr-FR" baseline="0" dirty="0" smtClean="0"/>
-              <a:t> the </a:t>
-            </a:r>
-            <a:r>
-              <a:rPr lang="fr-FR" baseline="0" dirty="0" err="1" smtClean="0"/>
-              <a:t>overall</a:t>
-            </a:r>
-            <a:r>
-              <a:rPr lang="fr-FR" baseline="0" dirty="0" smtClean="0"/>
-              <a:t> </a:t>
-            </a:r>
-            <a:r>
-              <a:rPr lang="fr-FR" baseline="0" dirty="0" err="1" smtClean="0"/>
-              <a:t>accuracy</a:t>
-            </a:r>
-            <a:r>
-              <a:rPr lang="fr-FR" baseline="0" dirty="0" smtClean="0"/>
-              <a:t> due to </a:t>
-            </a:r>
-            <a:r>
-              <a:rPr lang="fr-FR" baseline="0" dirty="0" err="1" smtClean="0"/>
-              <a:t>undertraining</a:t>
-            </a:r>
-            <a:r>
-              <a:rPr lang="fr-FR" baseline="0" dirty="0" smtClean="0"/>
-              <a:t> of the initial </a:t>
-            </a:r>
-            <a:r>
-              <a:rPr lang="fr-FR" baseline="0" dirty="0" err="1" smtClean="0"/>
-              <a:t>features</a:t>
             </a:r>
             <a:r>
               <a:rPr lang="fr-FR" baseline="0" dirty="0" smtClean="0"/>
@@ -19544,7 +19453,7 @@
           <a:p>
             <a:fld id="{285EE2EF-450C-4AB1-863E-1AB9ECC6F4A8}" type="datetime1">
               <a:rPr lang="en-US" smtClean="0"/>
-              <a:t>2/9/2016</a:t>
+              <a:t>2/12/2016</a:t>
             </a:fld>
             <a:endParaRPr lang="en-US" dirty="0"/>
           </a:p>
@@ -19755,7 +19664,7 @@
           <a:p>
             <a:fld id="{02113291-E271-4DC5-9AD3-4766BE44D5CD}" type="datetime1">
               <a:rPr lang="en-US" smtClean="0"/>
-              <a:t>2/9/2016</a:t>
+              <a:t>2/12/2016</a:t>
             </a:fld>
             <a:endParaRPr lang="en-US" dirty="0"/>
           </a:p>
@@ -19939,7 +19848,7 @@
           <a:p>
             <a:fld id="{88602952-954C-44DA-8B68-AE332788195E}" type="datetime1">
               <a:rPr lang="en-US" smtClean="0"/>
-              <a:t>2/9/2016</a:t>
+              <a:t>2/12/2016</a:t>
             </a:fld>
             <a:endParaRPr lang="en-US" dirty="0"/>
           </a:p>
@@ -20182,7 +20091,7 @@
           <a:p>
             <a:fld id="{4E4A068C-CA8D-49FF-8A92-1A0D66FC2041}" type="datetime1">
               <a:rPr lang="en-US" smtClean="0"/>
-              <a:t>2/9/2016</a:t>
+              <a:t>2/12/2016</a:t>
             </a:fld>
             <a:endParaRPr lang="en-US" dirty="0"/>
           </a:p>
@@ -26924,7 +26833,7 @@
           <a:p>
             <a:fld id="{CEC942C7-138D-44CF-83C6-275DFB2634AC}" type="datetime1">
               <a:rPr lang="en-US" smtClean="0"/>
-              <a:t>2/9/2016</a:t>
+              <a:t>2/12/2016</a:t>
             </a:fld>
             <a:endParaRPr lang="en-US" dirty="0"/>
           </a:p>
@@ -27202,7 +27111,7 @@
           <a:p>
             <a:fld id="{E55FA6F2-8D02-4340-B2E0-32D9BC184667}" type="datetime1">
               <a:rPr lang="en-US" smtClean="0"/>
-              <a:t>2/9/2016</a:t>
+              <a:t>2/12/2016</a:t>
             </a:fld>
             <a:endParaRPr lang="en-US" dirty="0"/>
           </a:p>
@@ -27609,7 +27518,7 @@
           <a:p>
             <a:fld id="{9D5FC7F4-C34E-4F0F-BF9B-5C1655CB6B58}" type="datetime1">
               <a:rPr lang="en-US" smtClean="0"/>
-              <a:t>2/9/2016</a:t>
+              <a:t>2/12/2016</a:t>
             </a:fld>
             <a:endParaRPr lang="en-US" dirty="0"/>
           </a:p>
@@ -27731,7 +27640,7 @@
           <a:p>
             <a:fld id="{309EF086-5F52-4F69-9798-D1D60485DDCD}" type="datetime1">
               <a:rPr lang="en-US" smtClean="0"/>
-              <a:t>2/9/2016</a:t>
+              <a:t>2/12/2016</a:t>
             </a:fld>
             <a:endParaRPr lang="en-US" dirty="0"/>
           </a:p>
@@ -27830,7 +27739,7 @@
           <a:p>
             <a:fld id="{EC1CC553-DF97-4908-83CB-2678F0B1D8DB}" type="datetime1">
               <a:rPr lang="en-US" smtClean="0"/>
-              <a:t>2/9/2016</a:t>
+              <a:t>2/12/2016</a:t>
             </a:fld>
             <a:endParaRPr lang="en-US" dirty="0"/>
           </a:p>
@@ -28126,7 +28035,7 @@
           <a:p>
             <a:fld id="{76E3A13B-F7AF-46AA-BB73-7120620AF5F2}" type="datetime1">
               <a:rPr lang="en-US" smtClean="0"/>
-              <a:t>2/9/2016</a:t>
+              <a:t>2/12/2016</a:t>
             </a:fld>
             <a:endParaRPr lang="en-US" dirty="0"/>
           </a:p>
@@ -28410,7 +28319,7 @@
           <a:p>
             <a:fld id="{D53B9274-90D4-4413-9837-EC0A021D5778}" type="datetime1">
               <a:rPr lang="en-US" smtClean="0"/>
-              <a:t>2/9/2016</a:t>
+              <a:t>2/12/2016</a:t>
             </a:fld>
             <a:endParaRPr lang="en-US" dirty="0"/>
           </a:p>
@@ -28664,7 +28573,7 @@
           <a:p>
             <a:fld id="{F8C17CF9-D75B-4452-87F8-7EC88804DB08}" type="datetime1">
               <a:rPr lang="en-US" smtClean="0"/>
-              <a:t>2/9/2016</a:t>
+              <a:t>2/12/2016</a:t>
             </a:fld>
             <a:endParaRPr lang="en-US" dirty="0"/>
           </a:p>
@@ -29471,7 +29380,7 @@
                     <m:sSub>
                       <m:sSubPr>
                         <m:ctrlPr>
-                          <a:rPr lang="fr-FR" sz="2200" i="1">
+                          <a:rPr lang="fr-FR" sz="2200" i="1" smtClean="0">
                             <a:ln>
                               <a:noFill/>
                             </a:ln>
@@ -29593,6 +29502,262 @@
                     </m:d>
                   </m:oMath>
                 </a14:m>
+                <a:endParaRPr lang="fr-FR" sz="2200" dirty="0" smtClean="0">
+                  <a:ln>
+                    <a:noFill/>
+                  </a:ln>
+                </a:endParaRPr>
+              </a:p>
+              <a:p>
+                <a:pPr marL="265176" lvl="1" indent="-137160" defTabSz="914400">
+                  <a:lnSpc>
+                    <a:spcPct val="150000"/>
+                  </a:lnSpc>
+                  <a:spcBef>
+                    <a:spcPts val="200"/>
+                  </a:spcBef>
+                  <a:spcAft>
+                    <a:spcPts val="400"/>
+                  </a:spcAft>
+                  <a:buClr>
+                    <a:schemeClr val="accent1"/>
+                  </a:buClr>
+                  <a:buFont typeface="Wingdings 3" pitchFamily="18" charset="2"/>
+                  <a:buChar char=""/>
+                </a:pPr>
+                <a14:m>
+                  <m:oMath xmlns:m="http://schemas.openxmlformats.org/officeDocument/2006/math">
+                    <m:sSub>
+                      <m:sSubPr>
+                        <m:ctrlPr>
+                          <a:rPr lang="en-US" sz="2200" b="0" i="1" smtClean="0">
+                            <a:ln>
+                              <a:noFill/>
+                            </a:ln>
+                            <a:latin typeface="Cambria Math" panose="02040503050406030204" pitchFamily="18" charset="0"/>
+                          </a:rPr>
+                        </m:ctrlPr>
+                      </m:sSubPr>
+                      <m:e>
+                        <m:r>
+                          <a:rPr lang="en-US" sz="2200" b="0" i="1" smtClean="0">
+                            <a:ln>
+                              <a:noFill/>
+                            </a:ln>
+                            <a:latin typeface="Cambria Math" panose="02040503050406030204" pitchFamily="18" charset="0"/>
+                          </a:rPr>
+                          <m:t>𝑃</m:t>
+                        </m:r>
+                      </m:e>
+                      <m:sub>
+                        <m:r>
+                          <a:rPr lang="en-US" sz="2200" b="0" i="1" smtClean="0">
+                            <a:ln>
+                              <a:noFill/>
+                            </a:ln>
+                            <a:latin typeface="Cambria Math" panose="02040503050406030204" pitchFamily="18" charset="0"/>
+                          </a:rPr>
+                          <m:t>𝑡𝑟𝑎𝑖𝑛</m:t>
+                        </m:r>
+                      </m:sub>
+                    </m:sSub>
+                    <m:d>
+                      <m:dPr>
+                        <m:ctrlPr>
+                          <a:rPr lang="en-US" sz="2200" b="0" i="1" smtClean="0">
+                            <a:ln>
+                              <a:noFill/>
+                            </a:ln>
+                            <a:latin typeface="Cambria Math" panose="02040503050406030204" pitchFamily="18" charset="0"/>
+                          </a:rPr>
+                        </m:ctrlPr>
+                      </m:dPr>
+                      <m:e>
+                        <m:r>
+                          <a:rPr lang="en-US" sz="2200" b="0" i="1" smtClean="0">
+                            <a:ln>
+                              <a:noFill/>
+                            </a:ln>
+                            <a:latin typeface="Cambria Math" panose="02040503050406030204" pitchFamily="18" charset="0"/>
+                          </a:rPr>
+                          <m:t>𝑍</m:t>
+                        </m:r>
+                      </m:e>
+                    </m:d>
+                    <m:r>
+                      <a:rPr lang="en-US" sz="2200" b="0" i="1" smtClean="0">
+                        <a:ln>
+                          <a:noFill/>
+                        </a:ln>
+                        <a:latin typeface="Cambria Math" panose="02040503050406030204" pitchFamily="18" charset="0"/>
+                      </a:rPr>
+                      <m:t>=</m:t>
+                    </m:r>
+                    <m:sSub>
+                      <m:sSubPr>
+                        <m:ctrlPr>
+                          <a:rPr lang="en-US" sz="2200" b="0" i="1" smtClean="0">
+                            <a:ln>
+                              <a:noFill/>
+                            </a:ln>
+                            <a:latin typeface="Cambria Math" panose="02040503050406030204" pitchFamily="18" charset="0"/>
+                          </a:rPr>
+                        </m:ctrlPr>
+                      </m:sSubPr>
+                      <m:e>
+                        <m:r>
+                          <a:rPr lang="en-US" sz="2200" b="0" i="1" smtClean="0">
+                            <a:ln>
+                              <a:noFill/>
+                            </a:ln>
+                            <a:latin typeface="Cambria Math" panose="02040503050406030204" pitchFamily="18" charset="0"/>
+                          </a:rPr>
+                          <m:t>𝑃</m:t>
+                        </m:r>
+                      </m:e>
+                      <m:sub>
+                        <m:r>
+                          <a:rPr lang="en-US" sz="2200" b="0" i="1" smtClean="0">
+                            <a:ln>
+                              <a:noFill/>
+                            </a:ln>
+                            <a:latin typeface="Cambria Math" panose="02040503050406030204" pitchFamily="18" charset="0"/>
+                          </a:rPr>
+                          <m:t>𝑡𝑒𝑠𝑡</m:t>
+                        </m:r>
+                      </m:sub>
+                    </m:sSub>
+                    <m:d>
+                      <m:dPr>
+                        <m:ctrlPr>
+                          <a:rPr lang="en-US" sz="2200" b="0" i="1" smtClean="0">
+                            <a:ln>
+                              <a:noFill/>
+                            </a:ln>
+                            <a:latin typeface="Cambria Math" panose="02040503050406030204" pitchFamily="18" charset="0"/>
+                          </a:rPr>
+                        </m:ctrlPr>
+                      </m:dPr>
+                      <m:e>
+                        <m:r>
+                          <a:rPr lang="en-US" sz="2200" b="0" i="1" smtClean="0">
+                            <a:ln>
+                              <a:noFill/>
+                            </a:ln>
+                            <a:latin typeface="Cambria Math" panose="02040503050406030204" pitchFamily="18" charset="0"/>
+                          </a:rPr>
+                          <m:t>𝑍</m:t>
+                        </m:r>
+                      </m:e>
+                    </m:d>
+                  </m:oMath>
+                </a14:m>
+                <a:endParaRPr lang="en-US" sz="2200" b="0" dirty="0" smtClean="0">
+                  <a:ln>
+                    <a:noFill/>
+                  </a:ln>
+                </a:endParaRPr>
+              </a:p>
+              <a:p>
+                <a:pPr marL="265176" lvl="1" indent="-137160" defTabSz="914400">
+                  <a:lnSpc>
+                    <a:spcPct val="150000"/>
+                  </a:lnSpc>
+                  <a:spcBef>
+                    <a:spcPts val="200"/>
+                  </a:spcBef>
+                  <a:spcAft>
+                    <a:spcPts val="400"/>
+                  </a:spcAft>
+                  <a:buClr>
+                    <a:schemeClr val="accent1"/>
+                  </a:buClr>
+                  <a:buFont typeface="Wingdings 3" pitchFamily="18" charset="2"/>
+                  <a:buChar char=""/>
+                </a:pPr>
+                <a14:m>
+                  <m:oMath xmlns:m="http://schemas.openxmlformats.org/officeDocument/2006/math">
+                    <m:r>
+                      <a:rPr lang="en-US" sz="2200" b="0" i="1" smtClean="0">
+                        <a:ln>
+                          <a:noFill/>
+                        </a:ln>
+                        <a:latin typeface="Cambria Math" panose="02040503050406030204" pitchFamily="18" charset="0"/>
+                      </a:rPr>
+                      <m:t>𝑃</m:t>
+                    </m:r>
+                    <m:d>
+                      <m:dPr>
+                        <m:ctrlPr>
+                          <a:rPr lang="en-US" sz="2200" b="0" i="1" smtClean="0">
+                            <a:ln>
+                              <a:noFill/>
+                            </a:ln>
+                            <a:latin typeface="Cambria Math" panose="02040503050406030204" pitchFamily="18" charset="0"/>
+                          </a:rPr>
+                        </m:ctrlPr>
+                      </m:dPr>
+                      <m:e>
+                        <m:r>
+                          <a:rPr lang="en-US" sz="2200" b="0" i="1" smtClean="0">
+                            <a:ln>
+                              <a:noFill/>
+                            </a:ln>
+                            <a:latin typeface="Cambria Math" panose="02040503050406030204" pitchFamily="18" charset="0"/>
+                          </a:rPr>
+                          <m:t>𝑌</m:t>
+                        </m:r>
+                        <m:r>
+                          <a:rPr lang="en-US" sz="2200" b="0" i="1" smtClean="0">
+                            <a:ln>
+                              <a:noFill/>
+                            </a:ln>
+                            <a:latin typeface="Cambria Math" panose="02040503050406030204" pitchFamily="18" charset="0"/>
+                          </a:rPr>
+                          <m:t>=1</m:t>
+                        </m:r>
+                      </m:e>
+                      <m:e>
+                        <m:r>
+                          <a:rPr lang="en-US" sz="2200" b="0" i="1" smtClean="0">
+                            <a:ln>
+                              <a:noFill/>
+                            </a:ln>
+                            <a:latin typeface="Cambria Math" panose="02040503050406030204" pitchFamily="18" charset="0"/>
+                          </a:rPr>
+                          <m:t>𝑍</m:t>
+                        </m:r>
+                        <m:r>
+                          <a:rPr lang="en-US" sz="2200" b="0" i="1" smtClean="0">
+                            <a:ln>
+                              <a:noFill/>
+                            </a:ln>
+                            <a:latin typeface="Cambria Math" panose="02040503050406030204" pitchFamily="18" charset="0"/>
+                          </a:rPr>
+                          <m:t>=1</m:t>
+                        </m:r>
+                      </m:e>
+                    </m:d>
+                    <m:r>
+                      <a:rPr lang="en-US" sz="2200" b="0" i="1" smtClean="0">
+                        <a:ln>
+                          <a:noFill/>
+                        </a:ln>
+                        <a:latin typeface="Cambria Math" panose="02040503050406030204" pitchFamily="18" charset="0"/>
+                      </a:rPr>
+                      <m:t>=</m:t>
+                    </m:r>
+                    <m:r>
+                      <a:rPr lang="en-US" sz="2200" b="0" i="1" smtClean="0">
+                        <a:ln>
+                          <a:noFill/>
+                        </a:ln>
+                        <a:latin typeface="Cambria Math" panose="02040503050406030204" pitchFamily="18" charset="0"/>
+                      </a:rPr>
+                      <m:t>𝑏</m:t>
+                    </m:r>
+                  </m:oMath>
+                </a14:m>
                 <a:endParaRPr lang="fr-FR" sz="2200" dirty="0">
                   <a:ln>
                     <a:noFill/>
@@ -29616,7 +29781,11 @@
                   <a:buFont typeface="Wingdings 3" pitchFamily="18" charset="2"/>
                   <a:buChar char=""/>
                 </a:pPr>
-                <a14:m/>
+                <a:endParaRPr lang="fr-FR" sz="2200" dirty="0">
+                  <a:ln>
+                    <a:noFill/>
+                  </a:ln>
+                </a:endParaRPr>
               </a:p>
               <a:p>
                 <a:pPr marL="265176" lvl="1" indent="-137160" defTabSz="914400">
@@ -30616,63 +30785,55 @@
             <p:ph idx="1"/>
           </p:nvPr>
         </p:nvSpPr>
-        <p:spPr/>
+        <p:spPr>
+          <a:xfrm>
+            <a:off x="768095" y="4823773"/>
+            <a:ext cx="8151223" cy="1646931"/>
+          </a:xfrm>
+        </p:spPr>
         <p:txBody>
-          <a:bodyPr/>
+          <a:bodyPr numCol="2">
+            <a:noAutofit/>
+          </a:bodyPr>
           <a:lstStyle/>
           <a:p>
             <a:r>
+              <a:rPr lang="fr-FR" dirty="0" err="1" smtClean="0"/>
+              <a:t>Logistic</a:t>
+            </a:r>
+            <a:r>
+              <a:rPr lang="fr-FR" dirty="0" smtClean="0"/>
+              <a:t> </a:t>
+            </a:r>
+            <a:r>
+              <a:rPr lang="fr-FR" dirty="0" err="1"/>
+              <a:t>Regression</a:t>
+            </a:r>
+            <a:r>
               <a:rPr lang="fr-FR" dirty="0"/>
-              <a:t>Back-</a:t>
-            </a:r>
-            <a:r>
-              <a:rPr lang="fr-FR" dirty="0" err="1"/>
-              <a:t>door</a:t>
-            </a:r>
-            <a:r>
-              <a:rPr lang="fr-FR" dirty="0"/>
-              <a:t> </a:t>
-            </a:r>
-            <a:r>
-              <a:rPr lang="fr-FR" dirty="0" err="1"/>
-              <a:t>Adjustment</a:t>
-            </a:r>
-            <a:r>
-              <a:rPr lang="fr-FR" dirty="0"/>
-              <a:t> (BA and BAZ10)</a:t>
+              <a:t> (LR)</a:t>
             </a:r>
           </a:p>
           <a:p>
             <a:r>
               <a:rPr lang="fr-FR" dirty="0" err="1" smtClean="0"/>
-              <a:t>Logistic</a:t>
+              <a:t>Subsampling</a:t>
             </a:r>
             <a:r>
               <a:rPr lang="fr-FR" dirty="0" smtClean="0"/>
               <a:t> </a:t>
             </a:r>
             <a:r>
-              <a:rPr lang="fr-FR" dirty="0" err="1"/>
-              <a:t>Regression</a:t>
-            </a:r>
-            <a:r>
               <a:rPr lang="fr-FR" dirty="0"/>
-              <a:t> (LR)</a:t>
+              <a:t>(S</a:t>
+            </a:r>
+            <a:r>
+              <a:rPr lang="fr-FR" dirty="0" smtClean="0"/>
+              <a:t>)</a:t>
             </a:r>
           </a:p>
           <a:p>
-            <a:r>
-              <a:rPr lang="fr-FR" dirty="0" err="1" smtClean="0"/>
-              <a:t>Subsampling</a:t>
-            </a:r>
-            <a:r>
-              <a:rPr lang="fr-FR" dirty="0" smtClean="0"/>
-              <a:t> </a:t>
-            </a:r>
-            <a:r>
-              <a:rPr lang="fr-FR" dirty="0"/>
-              <a:t>(S)</a:t>
-            </a:r>
+            <a:endParaRPr lang="fr-FR" dirty="0"/>
           </a:p>
           <a:p>
             <a:r>
@@ -30743,6 +30904,807 @@
               <a:t>13</a:t>
             </a:fld>
             <a:endParaRPr lang="en-US" dirty="0"/>
+          </a:p>
+        </p:txBody>
+      </p:sp>
+      <mc:AlternateContent xmlns:mc="http://schemas.openxmlformats.org/markup-compatibility/2006">
+        <mc:Choice xmlns:a14="http://schemas.microsoft.com/office/drawing/2010/main" Requires="a14">
+          <p:sp>
+            <p:nvSpPr>
+              <p:cNvPr id="6" name="TextBox 5"/>
+              <p:cNvSpPr txBox="1"/>
+              <p:nvPr/>
+            </p:nvSpPr>
+            <p:spPr>
+              <a:xfrm>
+                <a:off x="478780" y="2673157"/>
+                <a:ext cx="8105238" cy="1357872"/>
+              </a:xfrm>
+              <a:prstGeom prst="rect">
+                <a:avLst/>
+              </a:prstGeom>
+              <a:noFill/>
+            </p:spPr>
+            <p:txBody>
+              <a:bodyPr wrap="square" rtlCol="0">
+                <a:spAutoFit/>
+              </a:bodyPr>
+              <a:lstStyle/>
+              <a:p>
+                <a14:m>
+                  <m:oMathPara xmlns:m="http://schemas.openxmlformats.org/officeDocument/2006/math">
+                    <m:oMathParaPr>
+                      <m:jc m:val="centerGroup"/>
+                    </m:oMathParaPr>
+                    <m:oMath xmlns:m="http://schemas.openxmlformats.org/officeDocument/2006/math">
+                      <m:r>
+                        <a:rPr lang="en-US" sz="2400" b="0" i="1" smtClean="0">
+                          <a:latin typeface="Cambria Math" panose="02040503050406030204" pitchFamily="18" charset="0"/>
+                        </a:rPr>
+                        <m:t>𝐿</m:t>
+                      </m:r>
+                      <m:d>
+                        <m:dPr>
+                          <m:ctrlPr>
+                            <a:rPr lang="en-US" sz="2400" b="0" i="1" smtClean="0">
+                              <a:latin typeface="Cambria Math" panose="02040503050406030204" pitchFamily="18" charset="0"/>
+                            </a:rPr>
+                          </m:ctrlPr>
+                        </m:dPr>
+                        <m:e>
+                          <m:r>
+                            <a:rPr lang="en-US" sz="2400" b="0" i="1" smtClean="0">
+                              <a:latin typeface="Cambria Math" panose="02040503050406030204" pitchFamily="18" charset="0"/>
+                            </a:rPr>
+                            <m:t>𝐷</m:t>
+                          </m:r>
+                          <m:r>
+                            <a:rPr lang="en-US" sz="2400" b="0" i="1" smtClean="0">
+                              <a:latin typeface="Cambria Math" panose="02040503050406030204" pitchFamily="18" charset="0"/>
+                            </a:rPr>
+                            <m:t>,</m:t>
+                          </m:r>
+                          <m:r>
+                            <a:rPr lang="en-US" sz="2400" b="0" i="1" smtClean="0">
+                              <a:latin typeface="Cambria Math" panose="02040503050406030204" pitchFamily="18" charset="0"/>
+                            </a:rPr>
+                            <m:t>𝜃</m:t>
+                          </m:r>
+                        </m:e>
+                      </m:d>
+                      <m:r>
+                        <a:rPr lang="en-US" sz="2400" b="0" i="1" smtClean="0">
+                          <a:latin typeface="Cambria Math" panose="02040503050406030204" pitchFamily="18" charset="0"/>
+                        </a:rPr>
+                        <m:t>=</m:t>
+                      </m:r>
+                      <m:nary>
+                        <m:naryPr>
+                          <m:chr m:val="∑"/>
+                          <m:supHide m:val="on"/>
+                          <m:ctrlPr>
+                            <a:rPr lang="en-US" sz="2400" b="0" i="1" smtClean="0">
+                              <a:latin typeface="Cambria Math" panose="02040503050406030204" pitchFamily="18" charset="0"/>
+                            </a:rPr>
+                          </m:ctrlPr>
+                        </m:naryPr>
+                        <m:sub>
+                          <m:r>
+                            <m:rPr>
+                              <m:brk m:alnAt="7"/>
+                            </m:rPr>
+                            <a:rPr lang="en-US" sz="2400" b="0" i="1" smtClean="0">
+                              <a:latin typeface="Cambria Math" panose="02040503050406030204" pitchFamily="18" charset="0"/>
+                            </a:rPr>
+                            <m:t>𝑖</m:t>
+                          </m:r>
+                          <m:r>
+                            <a:rPr lang="en-US" sz="2400" b="0" i="1" smtClean="0">
+                              <a:latin typeface="Cambria Math" panose="02040503050406030204" pitchFamily="18" charset="0"/>
+                            </a:rPr>
+                            <m:t>∈</m:t>
+                          </m:r>
+                          <m:r>
+                            <a:rPr lang="en-US" sz="2400" b="0" i="1" smtClean="0">
+                              <a:latin typeface="Cambria Math" panose="02040503050406030204" pitchFamily="18" charset="0"/>
+                            </a:rPr>
+                            <m:t>𝐷</m:t>
+                          </m:r>
+                        </m:sub>
+                        <m:sup/>
+                        <m:e>
+                          <m:func>
+                            <m:funcPr>
+                              <m:ctrlPr>
+                                <a:rPr lang="en-US" sz="2400" b="0" i="1" smtClean="0">
+                                  <a:latin typeface="Cambria Math" panose="02040503050406030204" pitchFamily="18" charset="0"/>
+                                </a:rPr>
+                              </m:ctrlPr>
+                            </m:funcPr>
+                            <m:fName>
+                              <m:r>
+                                <m:rPr>
+                                  <m:sty m:val="p"/>
+                                </m:rPr>
+                                <a:rPr lang="en-US" sz="2400" b="0" i="0" smtClean="0">
+                                  <a:latin typeface="Cambria Math" panose="02040503050406030204" pitchFamily="18" charset="0"/>
+                                </a:rPr>
+                                <m:t>log</m:t>
+                              </m:r>
+                            </m:fName>
+                            <m:e>
+                              <m:sSub>
+                                <m:sSubPr>
+                                  <m:ctrlPr>
+                                    <a:rPr lang="en-US" sz="2400" b="0" i="1" smtClean="0">
+                                      <a:latin typeface="Cambria Math" panose="02040503050406030204" pitchFamily="18" charset="0"/>
+                                    </a:rPr>
+                                  </m:ctrlPr>
+                                </m:sSubPr>
+                                <m:e>
+                                  <m:r>
+                                    <a:rPr lang="en-US" sz="2400" b="0" i="1" smtClean="0">
+                                      <a:latin typeface="Cambria Math" panose="02040503050406030204" pitchFamily="18" charset="0"/>
+                                    </a:rPr>
+                                    <m:t>𝑝</m:t>
+                                  </m:r>
+                                </m:e>
+                                <m:sub>
+                                  <m:r>
+                                    <a:rPr lang="en-US" sz="2400" b="0" i="1" smtClean="0">
+                                      <a:latin typeface="Cambria Math" panose="02040503050406030204" pitchFamily="18" charset="0"/>
+                                    </a:rPr>
+                                    <m:t>𝜃</m:t>
+                                  </m:r>
+                                </m:sub>
+                              </m:sSub>
+                              <m:d>
+                                <m:dPr>
+                                  <m:ctrlPr>
+                                    <a:rPr lang="en-US" sz="2400" b="0" i="1" smtClean="0">
+                                      <a:latin typeface="Cambria Math" panose="02040503050406030204" pitchFamily="18" charset="0"/>
+                                    </a:rPr>
+                                  </m:ctrlPr>
+                                </m:dPr>
+                                <m:e>
+                                  <m:sSub>
+                                    <m:sSubPr>
+                                      <m:ctrlPr>
+                                        <a:rPr lang="en-US" sz="2400" b="0" i="1" smtClean="0">
+                                          <a:latin typeface="Cambria Math" panose="02040503050406030204" pitchFamily="18" charset="0"/>
+                                        </a:rPr>
+                                      </m:ctrlPr>
+                                    </m:sSubPr>
+                                    <m:e>
+                                      <m:r>
+                                        <a:rPr lang="en-US" sz="2400" b="0" i="1" smtClean="0">
+                                          <a:latin typeface="Cambria Math" panose="02040503050406030204" pitchFamily="18" charset="0"/>
+                                        </a:rPr>
+                                        <m:t>𝑦</m:t>
+                                      </m:r>
+                                    </m:e>
+                                    <m:sub>
+                                      <m:r>
+                                        <a:rPr lang="en-US" sz="2400" b="0" i="1" smtClean="0">
+                                          <a:latin typeface="Cambria Math" panose="02040503050406030204" pitchFamily="18" charset="0"/>
+                                        </a:rPr>
+                                        <m:t>𝑖</m:t>
+                                      </m:r>
+                                    </m:sub>
+                                  </m:sSub>
+                                </m:e>
+                                <m:e>
+                                  <m:sSub>
+                                    <m:sSubPr>
+                                      <m:ctrlPr>
+                                        <a:rPr lang="en-US" sz="2400" b="0" i="1" smtClean="0">
+                                          <a:latin typeface="Cambria Math" panose="02040503050406030204" pitchFamily="18" charset="0"/>
+                                        </a:rPr>
+                                      </m:ctrlPr>
+                                    </m:sSubPr>
+                                    <m:e>
+                                      <m:r>
+                                        <a:rPr lang="en-US" sz="2400" b="1" i="1" smtClean="0">
+                                          <a:latin typeface="Cambria Math" panose="02040503050406030204" pitchFamily="18" charset="0"/>
+                                        </a:rPr>
+                                        <m:t>𝒙</m:t>
+                                      </m:r>
+                                    </m:e>
+                                    <m:sub>
+                                      <m:r>
+                                        <a:rPr lang="en-US" sz="2400" b="0" i="1" smtClean="0">
+                                          <a:latin typeface="Cambria Math" panose="02040503050406030204" pitchFamily="18" charset="0"/>
+                                        </a:rPr>
+                                        <m:t>𝑖</m:t>
+                                      </m:r>
+                                    </m:sub>
+                                  </m:sSub>
+                                  <m:r>
+                                    <a:rPr lang="en-US" sz="2400" b="0" i="1" smtClean="0">
+                                      <a:latin typeface="Cambria Math" panose="02040503050406030204" pitchFamily="18" charset="0"/>
+                                    </a:rPr>
+                                    <m:t>,</m:t>
+                                  </m:r>
+                                  <m:sSub>
+                                    <m:sSubPr>
+                                      <m:ctrlPr>
+                                        <a:rPr lang="en-US" sz="2400" b="0" i="1" smtClean="0">
+                                          <a:latin typeface="Cambria Math" panose="02040503050406030204" pitchFamily="18" charset="0"/>
+                                        </a:rPr>
+                                      </m:ctrlPr>
+                                    </m:sSubPr>
+                                    <m:e>
+                                      <m:r>
+                                        <a:rPr lang="en-US" sz="2400" b="0" i="1" smtClean="0">
+                                          <a:latin typeface="Cambria Math" panose="02040503050406030204" pitchFamily="18" charset="0"/>
+                                        </a:rPr>
+                                        <m:t>𝑧</m:t>
+                                      </m:r>
+                                    </m:e>
+                                    <m:sub>
+                                      <m:r>
+                                        <a:rPr lang="en-US" sz="2400" b="0" i="1" smtClean="0">
+                                          <a:latin typeface="Cambria Math" panose="02040503050406030204" pitchFamily="18" charset="0"/>
+                                        </a:rPr>
+                                        <m:t>𝑖</m:t>
+                                      </m:r>
+                                    </m:sub>
+                                  </m:sSub>
+                                </m:e>
+                              </m:d>
+                              <m:r>
+                                <a:rPr lang="en-US" sz="2400" b="0" i="1" smtClean="0">
+                                  <a:solidFill>
+                                    <a:schemeClr val="accent2"/>
+                                  </a:solidFill>
+                                  <a:latin typeface="Cambria Math" panose="02040503050406030204" pitchFamily="18" charset="0"/>
+                                </a:rPr>
+                                <m:t>−</m:t>
+                              </m:r>
+                              <m:sSub>
+                                <m:sSubPr>
+                                  <m:ctrlPr>
+                                    <a:rPr lang="en-US" sz="2400" b="0" i="1" smtClean="0">
+                                      <a:solidFill>
+                                        <a:schemeClr val="accent2"/>
+                                      </a:solidFill>
+                                      <a:latin typeface="Cambria Math" panose="02040503050406030204" pitchFamily="18" charset="0"/>
+                                    </a:rPr>
+                                  </m:ctrlPr>
+                                </m:sSubPr>
+                                <m:e>
+                                  <m:r>
+                                    <a:rPr lang="en-US" sz="2400" b="0" i="1" smtClean="0">
+                                      <a:solidFill>
+                                        <a:schemeClr val="accent2"/>
+                                      </a:solidFill>
+                                      <a:latin typeface="Cambria Math" panose="02040503050406030204" pitchFamily="18" charset="0"/>
+                                    </a:rPr>
+                                    <m:t>𝜆</m:t>
+                                  </m:r>
+                                </m:e>
+                                <m:sub>
+                                  <m:r>
+                                    <a:rPr lang="en-US" sz="2400" b="0" i="1" smtClean="0">
+                                      <a:solidFill>
+                                        <a:schemeClr val="accent2"/>
+                                      </a:solidFill>
+                                      <a:latin typeface="Cambria Math" panose="02040503050406030204" pitchFamily="18" charset="0"/>
+                                    </a:rPr>
+                                    <m:t>𝑥</m:t>
+                                  </m:r>
+                                </m:sub>
+                              </m:sSub>
+                            </m:e>
+                          </m:func>
+                          <m:r>
+                            <a:rPr lang="en-US" sz="2400" b="0" i="1" smtClean="0">
+                              <a:solidFill>
+                                <a:schemeClr val="accent2"/>
+                              </a:solidFill>
+                              <a:latin typeface="Cambria Math" panose="02040503050406030204" pitchFamily="18" charset="0"/>
+                            </a:rPr>
+                            <m:t> </m:t>
+                          </m:r>
+                          <m:nary>
+                            <m:naryPr>
+                              <m:chr m:val="∑"/>
+                              <m:supHide m:val="on"/>
+                              <m:ctrlPr>
+                                <a:rPr lang="en-US" sz="2400" b="0" i="1" smtClean="0">
+                                  <a:solidFill>
+                                    <a:schemeClr val="accent2"/>
+                                  </a:solidFill>
+                                  <a:latin typeface="Cambria Math" panose="02040503050406030204" pitchFamily="18" charset="0"/>
+                                </a:rPr>
+                              </m:ctrlPr>
+                            </m:naryPr>
+                            <m:sub>
+                              <m:r>
+                                <m:rPr>
+                                  <m:brk m:alnAt="7"/>
+                                </m:rPr>
+                                <a:rPr lang="en-US" sz="2400" b="0" i="1" smtClean="0">
+                                  <a:solidFill>
+                                    <a:schemeClr val="accent2"/>
+                                  </a:solidFill>
+                                  <a:latin typeface="Cambria Math" panose="02040503050406030204" pitchFamily="18" charset="0"/>
+                                </a:rPr>
+                                <m:t>𝑘</m:t>
+                              </m:r>
+                            </m:sub>
+                            <m:sup/>
+                            <m:e>
+                              <m:sSup>
+                                <m:sSupPr>
+                                  <m:ctrlPr>
+                                    <a:rPr lang="en-US" sz="2400" b="0" i="1" smtClean="0">
+                                      <a:solidFill>
+                                        <a:schemeClr val="accent2"/>
+                                      </a:solidFill>
+                                      <a:latin typeface="Cambria Math" panose="02040503050406030204" pitchFamily="18" charset="0"/>
+                                    </a:rPr>
+                                  </m:ctrlPr>
+                                </m:sSupPr>
+                                <m:e>
+                                  <m:d>
+                                    <m:dPr>
+                                      <m:ctrlPr>
+                                        <a:rPr lang="en-US" sz="2400" b="0" i="1" smtClean="0">
+                                          <a:solidFill>
+                                            <a:schemeClr val="accent2"/>
+                                          </a:solidFill>
+                                          <a:latin typeface="Cambria Math" panose="02040503050406030204" pitchFamily="18" charset="0"/>
+                                        </a:rPr>
+                                      </m:ctrlPr>
+                                    </m:dPr>
+                                    <m:e>
+                                      <m:sSubSup>
+                                        <m:sSubSupPr>
+                                          <m:ctrlPr>
+                                            <a:rPr lang="en-US" sz="2400" b="0" i="1" smtClean="0">
+                                              <a:solidFill>
+                                                <a:schemeClr val="accent2"/>
+                                              </a:solidFill>
+                                              <a:latin typeface="Cambria Math" panose="02040503050406030204" pitchFamily="18" charset="0"/>
+                                            </a:rPr>
+                                          </m:ctrlPr>
+                                        </m:sSubSupPr>
+                                        <m:e>
+                                          <m:r>
+                                            <a:rPr lang="en-US" sz="2400" b="0" i="1" smtClean="0">
+                                              <a:solidFill>
+                                                <a:schemeClr val="accent2"/>
+                                              </a:solidFill>
+                                              <a:latin typeface="Cambria Math" panose="02040503050406030204" pitchFamily="18" charset="0"/>
+                                            </a:rPr>
+                                            <m:t>𝜃</m:t>
+                                          </m:r>
+                                        </m:e>
+                                        <m:sub>
+                                          <m:r>
+                                            <a:rPr lang="en-US" sz="2400" b="0" i="1" smtClean="0">
+                                              <a:solidFill>
+                                                <a:schemeClr val="accent2"/>
+                                              </a:solidFill>
+                                              <a:latin typeface="Cambria Math" panose="02040503050406030204" pitchFamily="18" charset="0"/>
+                                            </a:rPr>
+                                            <m:t>𝑘</m:t>
+                                          </m:r>
+                                        </m:sub>
+                                        <m:sup>
+                                          <m:r>
+                                            <a:rPr lang="en-US" sz="2400" b="0" i="1" smtClean="0">
+                                              <a:solidFill>
+                                                <a:schemeClr val="accent2"/>
+                                              </a:solidFill>
+                                              <a:latin typeface="Cambria Math" panose="02040503050406030204" pitchFamily="18" charset="0"/>
+                                            </a:rPr>
+                                            <m:t>𝑥</m:t>
+                                          </m:r>
+                                        </m:sup>
+                                      </m:sSubSup>
+                                    </m:e>
+                                  </m:d>
+                                </m:e>
+                                <m:sup>
+                                  <m:r>
+                                    <a:rPr lang="en-US" sz="2400" b="0" i="1" smtClean="0">
+                                      <a:solidFill>
+                                        <a:schemeClr val="accent2"/>
+                                      </a:solidFill>
+                                      <a:latin typeface="Cambria Math" panose="02040503050406030204" pitchFamily="18" charset="0"/>
+                                    </a:rPr>
+                                    <m:t>2</m:t>
+                                  </m:r>
+                                </m:sup>
+                              </m:sSup>
+                            </m:e>
+                          </m:nary>
+                          <m:r>
+                            <a:rPr lang="en-US" sz="2400" b="0" i="1" smtClean="0">
+                              <a:solidFill>
+                                <a:srgbClr val="C00000"/>
+                              </a:solidFill>
+                              <a:latin typeface="Cambria Math" panose="02040503050406030204" pitchFamily="18" charset="0"/>
+                            </a:rPr>
+                            <m:t>−</m:t>
+                          </m:r>
+                          <m:sSub>
+                            <m:sSubPr>
+                              <m:ctrlPr>
+                                <a:rPr lang="en-US" sz="2400" b="0" i="1" smtClean="0">
+                                  <a:solidFill>
+                                    <a:srgbClr val="C00000"/>
+                                  </a:solidFill>
+                                  <a:latin typeface="Cambria Math" panose="02040503050406030204" pitchFamily="18" charset="0"/>
+                                </a:rPr>
+                              </m:ctrlPr>
+                            </m:sSubPr>
+                            <m:e>
+                              <m:r>
+                                <a:rPr lang="en-US" sz="2400" b="0" i="1" smtClean="0">
+                                  <a:solidFill>
+                                    <a:srgbClr val="C00000"/>
+                                  </a:solidFill>
+                                  <a:latin typeface="Cambria Math" panose="02040503050406030204" pitchFamily="18" charset="0"/>
+                                </a:rPr>
+                                <m:t>𝜆</m:t>
+                              </m:r>
+                            </m:e>
+                            <m:sub>
+                              <m:r>
+                                <a:rPr lang="en-US" sz="2400" b="0" i="1" smtClean="0">
+                                  <a:solidFill>
+                                    <a:srgbClr val="C00000"/>
+                                  </a:solidFill>
+                                  <a:latin typeface="Cambria Math" panose="02040503050406030204" pitchFamily="18" charset="0"/>
+                                </a:rPr>
+                                <m:t>𝑧</m:t>
+                              </m:r>
+                            </m:sub>
+                          </m:sSub>
+                          <m:nary>
+                            <m:naryPr>
+                              <m:chr m:val="∑"/>
+                              <m:supHide m:val="on"/>
+                              <m:ctrlPr>
+                                <a:rPr lang="en-US" sz="2400" i="1">
+                                  <a:solidFill>
+                                    <a:srgbClr val="C00000"/>
+                                  </a:solidFill>
+                                  <a:latin typeface="Cambria Math" panose="02040503050406030204" pitchFamily="18" charset="0"/>
+                                </a:rPr>
+                              </m:ctrlPr>
+                            </m:naryPr>
+                            <m:sub>
+                              <m:r>
+                                <m:rPr>
+                                  <m:brk m:alnAt="7"/>
+                                </m:rPr>
+                                <a:rPr lang="en-US" sz="2400" i="1">
+                                  <a:solidFill>
+                                    <a:srgbClr val="C00000"/>
+                                  </a:solidFill>
+                                  <a:latin typeface="Cambria Math" panose="02040503050406030204" pitchFamily="18" charset="0"/>
+                                </a:rPr>
+                                <m:t>𝑘</m:t>
+                              </m:r>
+                            </m:sub>
+                            <m:sup/>
+                            <m:e>
+                              <m:sSup>
+                                <m:sSupPr>
+                                  <m:ctrlPr>
+                                    <a:rPr lang="en-US" sz="2400" i="1">
+                                      <a:solidFill>
+                                        <a:srgbClr val="C00000"/>
+                                      </a:solidFill>
+                                      <a:latin typeface="Cambria Math" panose="02040503050406030204" pitchFamily="18" charset="0"/>
+                                    </a:rPr>
+                                  </m:ctrlPr>
+                                </m:sSupPr>
+                                <m:e>
+                                  <m:d>
+                                    <m:dPr>
+                                      <m:ctrlPr>
+                                        <a:rPr lang="en-US" sz="2400" i="1">
+                                          <a:solidFill>
+                                            <a:srgbClr val="C00000"/>
+                                          </a:solidFill>
+                                          <a:latin typeface="Cambria Math" panose="02040503050406030204" pitchFamily="18" charset="0"/>
+                                        </a:rPr>
+                                      </m:ctrlPr>
+                                    </m:dPr>
+                                    <m:e>
+                                      <m:sSubSup>
+                                        <m:sSubSupPr>
+                                          <m:ctrlPr>
+                                            <a:rPr lang="en-US" sz="2400" i="1">
+                                              <a:solidFill>
+                                                <a:srgbClr val="C00000"/>
+                                              </a:solidFill>
+                                              <a:latin typeface="Cambria Math" panose="02040503050406030204" pitchFamily="18" charset="0"/>
+                                            </a:rPr>
+                                          </m:ctrlPr>
+                                        </m:sSubSupPr>
+                                        <m:e>
+                                          <m:r>
+                                            <a:rPr lang="en-US" sz="2400" i="1">
+                                              <a:solidFill>
+                                                <a:srgbClr val="C00000"/>
+                                              </a:solidFill>
+                                              <a:latin typeface="Cambria Math" panose="02040503050406030204" pitchFamily="18" charset="0"/>
+                                            </a:rPr>
+                                            <m:t>𝜃</m:t>
+                                          </m:r>
+                                        </m:e>
+                                        <m:sub>
+                                          <m:r>
+                                            <a:rPr lang="en-US" sz="2400" i="1">
+                                              <a:solidFill>
+                                                <a:srgbClr val="C00000"/>
+                                              </a:solidFill>
+                                              <a:latin typeface="Cambria Math" panose="02040503050406030204" pitchFamily="18" charset="0"/>
+                                            </a:rPr>
+                                            <m:t>𝑘</m:t>
+                                          </m:r>
+                                        </m:sub>
+                                        <m:sup>
+                                          <m:r>
+                                            <a:rPr lang="en-US" sz="2400" b="0" i="1" smtClean="0">
+                                              <a:solidFill>
+                                                <a:srgbClr val="C00000"/>
+                                              </a:solidFill>
+                                              <a:latin typeface="Cambria Math" panose="02040503050406030204" pitchFamily="18" charset="0"/>
+                                            </a:rPr>
+                                            <m:t>𝑧</m:t>
+                                          </m:r>
+                                        </m:sup>
+                                      </m:sSubSup>
+                                    </m:e>
+                                  </m:d>
+                                </m:e>
+                                <m:sup>
+                                  <m:r>
+                                    <a:rPr lang="en-US" sz="2400" i="1">
+                                      <a:solidFill>
+                                        <a:srgbClr val="C00000"/>
+                                      </a:solidFill>
+                                      <a:latin typeface="Cambria Math" panose="02040503050406030204" pitchFamily="18" charset="0"/>
+                                    </a:rPr>
+                                    <m:t>2</m:t>
+                                  </m:r>
+                                </m:sup>
+                              </m:sSup>
+                            </m:e>
+                          </m:nary>
+                        </m:e>
+                      </m:nary>
+                    </m:oMath>
+                  </m:oMathPara>
+                </a14:m>
+                <a:endParaRPr lang="en-US" sz="2400" b="0" i="1" dirty="0" smtClean="0">
+                  <a:latin typeface="Cambria Math" panose="02040503050406030204" pitchFamily="18" charset="0"/>
+                </a:endParaRPr>
+              </a:p>
+              <a:p>
+                <a:r>
+                  <a:rPr lang="en-US" sz="2400" dirty="0" smtClean="0">
+                    <a:latin typeface="Cambria Math" panose="02040503050406030204" pitchFamily="18" charset="0"/>
+                  </a:rPr>
+                  <a:t>with </a:t>
+                </a:r>
+                <a14:m>
+                  <m:oMath xmlns:m="http://schemas.openxmlformats.org/officeDocument/2006/math">
+                    <m:sSub>
+                      <m:sSubPr>
+                        <m:ctrlPr>
+                          <a:rPr lang="en-US" sz="2400" b="0" i="1" smtClean="0">
+                            <a:solidFill>
+                              <a:schemeClr val="accent2"/>
+                            </a:solidFill>
+                            <a:latin typeface="Cambria Math" panose="02040503050406030204" pitchFamily="18" charset="0"/>
+                          </a:rPr>
+                        </m:ctrlPr>
+                      </m:sSubPr>
+                      <m:e>
+                        <m:r>
+                          <a:rPr lang="en-US" sz="2400" b="0" i="1" smtClean="0">
+                            <a:solidFill>
+                              <a:schemeClr val="accent2"/>
+                            </a:solidFill>
+                            <a:latin typeface="Cambria Math" panose="02040503050406030204" pitchFamily="18" charset="0"/>
+                          </a:rPr>
+                          <m:t>𝜆</m:t>
+                        </m:r>
+                      </m:e>
+                      <m:sub>
+                        <m:r>
+                          <a:rPr lang="en-US" sz="2400" b="0" i="1" smtClean="0">
+                            <a:solidFill>
+                              <a:schemeClr val="accent2"/>
+                            </a:solidFill>
+                            <a:latin typeface="Cambria Math" panose="02040503050406030204" pitchFamily="18" charset="0"/>
+                          </a:rPr>
+                          <m:t>𝑧</m:t>
+                        </m:r>
+                      </m:sub>
+                    </m:sSub>
+                    <m:r>
+                      <a:rPr lang="en-US" sz="2400" b="0" i="1" smtClean="0">
+                        <a:latin typeface="Cambria Math" panose="02040503050406030204" pitchFamily="18" charset="0"/>
+                      </a:rPr>
+                      <m:t>&lt;</m:t>
+                    </m:r>
+                    <m:sSub>
+                      <m:sSubPr>
+                        <m:ctrlPr>
+                          <a:rPr lang="en-US" sz="2400" b="0" i="1" smtClean="0">
+                            <a:solidFill>
+                              <a:srgbClr val="C00000"/>
+                            </a:solidFill>
+                            <a:latin typeface="Cambria Math" panose="02040503050406030204" pitchFamily="18" charset="0"/>
+                          </a:rPr>
+                        </m:ctrlPr>
+                      </m:sSubPr>
+                      <m:e>
+                        <m:r>
+                          <a:rPr lang="en-US" sz="2400" b="0" i="1" smtClean="0">
+                            <a:solidFill>
+                              <a:srgbClr val="C00000"/>
+                            </a:solidFill>
+                            <a:latin typeface="Cambria Math" panose="02040503050406030204" pitchFamily="18" charset="0"/>
+                          </a:rPr>
+                          <m:t>𝜆</m:t>
+                        </m:r>
+                      </m:e>
+                      <m:sub>
+                        <m:r>
+                          <a:rPr lang="en-US" sz="2400" b="0" i="1" smtClean="0">
+                            <a:solidFill>
+                              <a:srgbClr val="C00000"/>
+                            </a:solidFill>
+                            <a:latin typeface="Cambria Math" panose="02040503050406030204" pitchFamily="18" charset="0"/>
+                          </a:rPr>
+                          <m:t>𝑥</m:t>
+                        </m:r>
+                      </m:sub>
+                    </m:sSub>
+                  </m:oMath>
+                </a14:m>
+                <a:r>
+                  <a:rPr lang="en-US" sz="2400" b="0" dirty="0" smtClean="0">
+                    <a:latin typeface="Cambria Math" panose="02040503050406030204" pitchFamily="18" charset="0"/>
+                  </a:rPr>
+                  <a:t>.</a:t>
+                </a:r>
+              </a:p>
+            </p:txBody>
+          </p:sp>
+        </mc:Choice>
+        <mc:Fallback>
+          <p:sp>
+            <p:nvSpPr>
+              <p:cNvPr id="6" name="TextBox 5"/>
+              <p:cNvSpPr txBox="1">
+                <a:spLocks noRot="1" noChangeAspect="1" noMove="1" noResize="1" noEditPoints="1" noAdjustHandles="1" noChangeArrowheads="1" noChangeShapeType="1" noTextEdit="1"/>
+              </p:cNvSpPr>
+              <p:nvPr/>
+            </p:nvSpPr>
+            <p:spPr>
+              <a:xfrm>
+                <a:off x="478780" y="2673157"/>
+                <a:ext cx="8105238" cy="1357872"/>
+              </a:xfrm>
+              <a:prstGeom prst="rect">
+                <a:avLst/>
+              </a:prstGeom>
+              <a:blipFill>
+                <a:blip r:embed="rId3"/>
+                <a:stretch>
+                  <a:fillRect l="-1204" b="-9459"/>
+                </a:stretch>
+              </a:blipFill>
+            </p:spPr>
+            <p:txBody>
+              <a:bodyPr/>
+              <a:lstStyle/>
+              <a:p>
+                <a:r>
+                  <a:rPr lang="en-US">
+                    <a:noFill/>
+                  </a:rPr>
+                  <a:t> </a:t>
+                </a:r>
+              </a:p>
+            </p:txBody>
+          </p:sp>
+        </mc:Fallback>
+      </mc:AlternateContent>
+      <p:sp>
+        <p:nvSpPr>
+          <p:cNvPr id="8" name="Rectangle 7"/>
+          <p:cNvSpPr/>
+          <p:nvPr/>
+        </p:nvSpPr>
+        <p:spPr>
+          <a:xfrm>
+            <a:off x="768095" y="1893892"/>
+            <a:ext cx="7815923" cy="692497"/>
+          </a:xfrm>
+          <a:prstGeom prst="rect">
+            <a:avLst/>
+          </a:prstGeom>
+        </p:spPr>
+        <p:txBody>
+          <a:bodyPr wrap="square">
+            <a:spAutoFit/>
+          </a:bodyPr>
+          <a:lstStyle/>
+          <a:p>
+            <a:pPr marL="171450" lvl="0" indent="-171450" defTabSz="914400">
+              <a:lnSpc>
+                <a:spcPct val="150000"/>
+              </a:lnSpc>
+              <a:spcBef>
+                <a:spcPts val="1200"/>
+              </a:spcBef>
+              <a:spcAft>
+                <a:spcPts val="200"/>
+              </a:spcAft>
+              <a:buClr>
+                <a:srgbClr val="1CADE4"/>
+              </a:buClr>
+              <a:buSzPct val="75000"/>
+              <a:buFont typeface="Wingdings" panose="05000000000000000000" pitchFamily="2" charset="2"/>
+              <a:buChar char="§"/>
+            </a:pPr>
+            <a:r>
+              <a:rPr lang="fr-FR" sz="2600" dirty="0">
+                <a:solidFill>
+                  <a:prstClr val="black"/>
+                </a:solidFill>
+              </a:rPr>
+              <a:t>Back-</a:t>
+            </a:r>
+            <a:r>
+              <a:rPr lang="fr-FR" sz="2600" dirty="0" err="1">
+                <a:solidFill>
+                  <a:prstClr val="black"/>
+                </a:solidFill>
+              </a:rPr>
+              <a:t>door</a:t>
+            </a:r>
+            <a:r>
+              <a:rPr lang="fr-FR" sz="2600" dirty="0">
+                <a:solidFill>
+                  <a:prstClr val="black"/>
+                </a:solidFill>
+              </a:rPr>
+              <a:t> </a:t>
+            </a:r>
+            <a:r>
+              <a:rPr lang="fr-FR" sz="2600" dirty="0" err="1">
+                <a:solidFill>
+                  <a:prstClr val="black"/>
+                </a:solidFill>
+              </a:rPr>
+              <a:t>Adjustment</a:t>
+            </a:r>
+            <a:r>
+              <a:rPr lang="fr-FR" sz="2600" dirty="0">
+                <a:solidFill>
+                  <a:prstClr val="black"/>
+                </a:solidFill>
+              </a:rPr>
+              <a:t> (BA and BAZ10)</a:t>
+            </a:r>
+            <a:endParaRPr lang="fr-FR" sz="2600" dirty="0">
+              <a:solidFill>
+                <a:prstClr val="black"/>
+              </a:solidFill>
+            </a:endParaRPr>
           </a:p>
         </p:txBody>
       </p:sp>
@@ -31641,6 +32603,11 @@
               <a:rPr lang="en-US" dirty="0" smtClean="0"/>
               <a:t>Development of text classification over more than 50 years</a:t>
             </a:r>
+            <a:r>
+              <a:rPr lang="en-US" baseline="30000" dirty="0"/>
+              <a:t>1</a:t>
+            </a:r>
+            <a:endParaRPr lang="en-US" dirty="0" smtClean="0"/>
           </a:p>
           <a:p>
             <a:r>
@@ -31701,6 +32668,58 @@
               <a:t> need classifiers robust to confounding variables</a:t>
             </a:r>
             <a:endParaRPr lang="en-US" dirty="0"/>
+          </a:p>
+        </p:txBody>
+      </p:sp>
+      <p:sp>
+        <p:nvSpPr>
+          <p:cNvPr id="7" name="Footer Placeholder 4"/>
+          <p:cNvSpPr txBox="1">
+            <a:spLocks/>
+          </p:cNvSpPr>
+          <p:nvPr/>
+        </p:nvSpPr>
+        <p:spPr>
+          <a:xfrm>
+            <a:off x="0" y="6377031"/>
+            <a:ext cx="4245935" cy="461665"/>
+          </a:xfrm>
+          <a:prstGeom prst="rect">
+            <a:avLst/>
+          </a:prstGeom>
+          <a:noFill/>
+        </p:spPr>
+        <p:txBody>
+          <a:bodyPr wrap="square" rtlCol="0">
+            <a:spAutoFit/>
+          </a:bodyPr>
+          <a:lstStyle>
+            <a:defPPr>
+              <a:defRPr lang="en-US"/>
+            </a:defPPr>
+            <a:lvl1pPr>
+              <a:defRPr sz="1200">
+                <a:solidFill>
+                  <a:schemeClr val="bg1">
+                    <a:lumMod val="50000"/>
+                  </a:schemeClr>
+                </a:solidFill>
+              </a:defRPr>
+            </a:lvl1pPr>
+          </a:lstStyle>
+          <a:p>
+            <a:r>
+              <a:rPr lang="en-US" dirty="0" smtClean="0"/>
+              <a:t>1 - </a:t>
+            </a:r>
+            <a:r>
+              <a:rPr lang="en-US" dirty="0" err="1"/>
+              <a:t>Maron</a:t>
+            </a:r>
+            <a:r>
+              <a:rPr lang="en-US" dirty="0"/>
+              <a:t>, M. E. 1961. Automatic indexing: an experimental inquiry. Journal of the ACM (JACM) 8(3):404–417.</a:t>
+            </a:r>
           </a:p>
         </p:txBody>
       </p:sp>
@@ -31781,7 +32800,7 @@
           <a:p>
             <a:r>
               <a:rPr lang="en-US" dirty="0" smtClean="0"/>
-              <a:t>Male (resp. Female) and New York (resp. Los Angeles) are highly correlated.</a:t>
+              <a:t>Female (resp. Male) and New York (resp. Los Angeles) are highly correlated.</a:t>
             </a:r>
             <a:endParaRPr lang="en-US" dirty="0"/>
           </a:p>
@@ -36245,8 +37264,8 @@
           </a:p>
         </p:txBody>
       </p:sp>
-      <mc:AlternateContent xmlns:mc="http://schemas.openxmlformats.org/markup-compatibility/2006">
-        <mc:Choice xmlns:a14="http://schemas.microsoft.com/office/drawing/2010/main" Requires="a14">
+      <mc:AlternateContent xmlns:mc="http://schemas.openxmlformats.org/markup-compatibility/2006" xmlns:a14="http://schemas.microsoft.com/office/drawing/2010/main">
+        <mc:Choice Requires="a14">
           <p:sp>
             <p:nvSpPr>
               <p:cNvPr id="6" name="Rectangle 5"/>
@@ -36416,7 +37435,7 @@
             </p:txBody>
           </p:sp>
         </mc:Choice>
-        <mc:Fallback>
+        <mc:Fallback xmlns="">
           <p:sp>
             <p:nvSpPr>
               <p:cNvPr id="6" name="Rectangle 5"/>
@@ -36455,8 +37474,8 @@
           </p:sp>
         </mc:Fallback>
       </mc:AlternateContent>
-      <mc:AlternateContent xmlns:mc="http://schemas.openxmlformats.org/markup-compatibility/2006">
-        <mc:Choice xmlns:a14="http://schemas.microsoft.com/office/drawing/2010/main" Requires="a14">
+      <mc:AlternateContent xmlns:mc="http://schemas.openxmlformats.org/markup-compatibility/2006" xmlns:a14="http://schemas.microsoft.com/office/drawing/2010/main">
+        <mc:Choice Requires="a14">
           <p:sp>
             <p:nvSpPr>
               <p:cNvPr id="7" name="Rectangle 6"/>
@@ -36753,7 +37772,7 @@
             </p:txBody>
           </p:sp>
         </mc:Choice>
-        <mc:Fallback>
+        <mc:Fallback xmlns="">
           <p:sp>
             <p:nvSpPr>
               <p:cNvPr id="7" name="Rectangle 6"/>
@@ -36864,13 +37883,6 @@
               </a:rPr>
               <a:t>(2011).</a:t>
             </a:r>
-            <a:endParaRPr lang="en-US" sz="1200" dirty="0">
-              <a:solidFill>
-                <a:schemeClr val="bg1">
-                  <a:lumMod val="50000"/>
-                </a:schemeClr>
-              </a:solidFill>
-            </a:endParaRPr>
           </a:p>
         </p:txBody>
       </p:sp>

</xml_diff>